<commit_message>
Updated 2025 election image + style
</commit_message>
<xml_diff>
--- a/2025Canada/banner.pptx
+++ b/2025Canada/banner.pptx
@@ -2,21 +2,23 @@
 <file path=ppt/presentation.xml><?xml version="1.0" encoding="utf-8"?>
 <p:presentation xmlns:a="http://schemas.openxmlformats.org/drawingml/2006/main" xmlns:r="http://schemas.openxmlformats.org/officeDocument/2006/relationships" xmlns:p="http://schemas.openxmlformats.org/presentationml/2006/main" saveSubsetFonts="1">
   <p:sldMasterIdLst>
-    <p:sldMasterId id="2147483648" r:id="rId1"/>
+    <p:sldMasterId id="2147483660" r:id="rId1"/>
   </p:sldMasterIdLst>
   <p:notesMasterIdLst>
-    <p:notesMasterId r:id="rId3"/>
+    <p:notesMasterId r:id="rId5"/>
   </p:notesMasterIdLst>
   <p:sldIdLst>
     <p:sldId id="256" r:id="rId2"/>
+    <p:sldId id="257" r:id="rId3"/>
+    <p:sldId id="258" r:id="rId4"/>
   </p:sldIdLst>
-  <p:sldSz cx="12192000" cy="6858000"/>
+  <p:sldSz cx="10799763" cy="5759450"/>
   <p:notesSz cx="6858000" cy="9144000"/>
   <p:defaultTextStyle>
     <a:defPPr>
       <a:defRPr lang="en-US"/>
     </a:defPPr>
-    <a:lvl1pPr marL="0" algn="l" defTabSz="914400" rtl="0" eaLnBrk="1" latinLnBrk="0" hangingPunct="1">
+    <a:lvl1pPr marL="0" algn="l" defTabSz="457200" rtl="0" eaLnBrk="1" latinLnBrk="0" hangingPunct="1">
       <a:defRPr sz="1800" kern="1200">
         <a:solidFill>
           <a:schemeClr val="tx1"/>
@@ -26,7 +28,7 @@
         <a:cs typeface="+mn-cs"/>
       </a:defRPr>
     </a:lvl1pPr>
-    <a:lvl2pPr marL="457200" algn="l" defTabSz="914400" rtl="0" eaLnBrk="1" latinLnBrk="0" hangingPunct="1">
+    <a:lvl2pPr marL="457200" algn="l" defTabSz="457200" rtl="0" eaLnBrk="1" latinLnBrk="0" hangingPunct="1">
       <a:defRPr sz="1800" kern="1200">
         <a:solidFill>
           <a:schemeClr val="tx1"/>
@@ -36,7 +38,7 @@
         <a:cs typeface="+mn-cs"/>
       </a:defRPr>
     </a:lvl2pPr>
-    <a:lvl3pPr marL="914400" algn="l" defTabSz="914400" rtl="0" eaLnBrk="1" latinLnBrk="0" hangingPunct="1">
+    <a:lvl3pPr marL="914400" algn="l" defTabSz="457200" rtl="0" eaLnBrk="1" latinLnBrk="0" hangingPunct="1">
       <a:defRPr sz="1800" kern="1200">
         <a:solidFill>
           <a:schemeClr val="tx1"/>
@@ -46,7 +48,7 @@
         <a:cs typeface="+mn-cs"/>
       </a:defRPr>
     </a:lvl3pPr>
-    <a:lvl4pPr marL="1371600" algn="l" defTabSz="914400" rtl="0" eaLnBrk="1" latinLnBrk="0" hangingPunct="1">
+    <a:lvl4pPr marL="1371600" algn="l" defTabSz="457200" rtl="0" eaLnBrk="1" latinLnBrk="0" hangingPunct="1">
       <a:defRPr sz="1800" kern="1200">
         <a:solidFill>
           <a:schemeClr val="tx1"/>
@@ -56,7 +58,7 @@
         <a:cs typeface="+mn-cs"/>
       </a:defRPr>
     </a:lvl4pPr>
-    <a:lvl5pPr marL="1828800" algn="l" defTabSz="914400" rtl="0" eaLnBrk="1" latinLnBrk="0" hangingPunct="1">
+    <a:lvl5pPr marL="1828800" algn="l" defTabSz="457200" rtl="0" eaLnBrk="1" latinLnBrk="0" hangingPunct="1">
       <a:defRPr sz="1800" kern="1200">
         <a:solidFill>
           <a:schemeClr val="tx1"/>
@@ -66,7 +68,7 @@
         <a:cs typeface="+mn-cs"/>
       </a:defRPr>
     </a:lvl5pPr>
-    <a:lvl6pPr marL="2286000" algn="l" defTabSz="914400" rtl="0" eaLnBrk="1" latinLnBrk="0" hangingPunct="1">
+    <a:lvl6pPr marL="2286000" algn="l" defTabSz="457200" rtl="0" eaLnBrk="1" latinLnBrk="0" hangingPunct="1">
       <a:defRPr sz="1800" kern="1200">
         <a:solidFill>
           <a:schemeClr val="tx1"/>
@@ -76,7 +78,7 @@
         <a:cs typeface="+mn-cs"/>
       </a:defRPr>
     </a:lvl6pPr>
-    <a:lvl7pPr marL="2743200" algn="l" defTabSz="914400" rtl="0" eaLnBrk="1" latinLnBrk="0" hangingPunct="1">
+    <a:lvl7pPr marL="2743200" algn="l" defTabSz="457200" rtl="0" eaLnBrk="1" latinLnBrk="0" hangingPunct="1">
       <a:defRPr sz="1800" kern="1200">
         <a:solidFill>
           <a:schemeClr val="tx1"/>
@@ -86,7 +88,7 @@
         <a:cs typeface="+mn-cs"/>
       </a:defRPr>
     </a:lvl7pPr>
-    <a:lvl8pPr marL="3200400" algn="l" defTabSz="914400" rtl="0" eaLnBrk="1" latinLnBrk="0" hangingPunct="1">
+    <a:lvl8pPr marL="3200400" algn="l" defTabSz="457200" rtl="0" eaLnBrk="1" latinLnBrk="0" hangingPunct="1">
       <a:defRPr sz="1800" kern="1200">
         <a:solidFill>
           <a:schemeClr val="tx1"/>
@@ -96,7 +98,7 @@
         <a:cs typeface="+mn-cs"/>
       </a:defRPr>
     </a:lvl8pPr>
-    <a:lvl9pPr marL="3657600" algn="l" defTabSz="914400" rtl="0" eaLnBrk="1" latinLnBrk="0" hangingPunct="1">
+    <a:lvl9pPr marL="3657600" algn="l" defTabSz="457200" rtl="0" eaLnBrk="1" latinLnBrk="0" hangingPunct="1">
       <a:defRPr sz="1800" kern="1200">
         <a:solidFill>
           <a:schemeClr val="tx1"/>
@@ -197,7 +199,7 @@
           <a:p>
             <a:fld id="{977D88BF-532D-45F8-8705-6DC58283B8DF}" type="datetimeFigureOut">
               <a:rPr lang="en-CA" smtClean="0"/>
-              <a:t>2025-07-24</a:t>
+              <a:t>2025-08-22</a:t>
             </a:fld>
             <a:endParaRPr lang="en-CA"/>
           </a:p>
@@ -215,8 +217,8 @@
         </p:nvSpPr>
         <p:spPr>
           <a:xfrm>
-            <a:off x="685800" y="1143000"/>
-            <a:ext cx="5486400" cy="3086100"/>
+            <a:off x="536575" y="1143000"/>
+            <a:ext cx="5784850" cy="3086100"/>
           </a:xfrm>
           <a:prstGeom prst="rect">
             <a:avLst/>
@@ -371,8 +373,8 @@
   </p:cSld>
   <p:clrMap bg1="lt1" tx1="dk1" bg2="lt2" tx2="dk2" accent1="accent1" accent2="accent2" accent3="accent3" accent4="accent4" accent5="accent5" accent6="accent6" hlink="hlink" folHlink="folHlink"/>
   <p:notesStyle>
-    <a:lvl1pPr marL="0" algn="l" defTabSz="914400" rtl="0" eaLnBrk="1" latinLnBrk="0" hangingPunct="1">
-      <a:defRPr sz="1200" kern="1200">
+    <a:lvl1pPr marL="0" algn="l" defTabSz="794796" rtl="0" eaLnBrk="1" latinLnBrk="0" hangingPunct="1">
+      <a:defRPr sz="1043" kern="1200">
         <a:solidFill>
           <a:schemeClr val="tx1"/>
         </a:solidFill>
@@ -381,8 +383,8 @@
         <a:cs typeface="+mn-cs"/>
       </a:defRPr>
     </a:lvl1pPr>
-    <a:lvl2pPr marL="457200" algn="l" defTabSz="914400" rtl="0" eaLnBrk="1" latinLnBrk="0" hangingPunct="1">
-      <a:defRPr sz="1200" kern="1200">
+    <a:lvl2pPr marL="397398" algn="l" defTabSz="794796" rtl="0" eaLnBrk="1" latinLnBrk="0" hangingPunct="1">
+      <a:defRPr sz="1043" kern="1200">
         <a:solidFill>
           <a:schemeClr val="tx1"/>
         </a:solidFill>
@@ -391,8 +393,8 @@
         <a:cs typeface="+mn-cs"/>
       </a:defRPr>
     </a:lvl2pPr>
-    <a:lvl3pPr marL="914400" algn="l" defTabSz="914400" rtl="0" eaLnBrk="1" latinLnBrk="0" hangingPunct="1">
-      <a:defRPr sz="1200" kern="1200">
+    <a:lvl3pPr marL="794796" algn="l" defTabSz="794796" rtl="0" eaLnBrk="1" latinLnBrk="0" hangingPunct="1">
+      <a:defRPr sz="1043" kern="1200">
         <a:solidFill>
           <a:schemeClr val="tx1"/>
         </a:solidFill>
@@ -401,8 +403,8 @@
         <a:cs typeface="+mn-cs"/>
       </a:defRPr>
     </a:lvl3pPr>
-    <a:lvl4pPr marL="1371600" algn="l" defTabSz="914400" rtl="0" eaLnBrk="1" latinLnBrk="0" hangingPunct="1">
-      <a:defRPr sz="1200" kern="1200">
+    <a:lvl4pPr marL="1192195" algn="l" defTabSz="794796" rtl="0" eaLnBrk="1" latinLnBrk="0" hangingPunct="1">
+      <a:defRPr sz="1043" kern="1200">
         <a:solidFill>
           <a:schemeClr val="tx1"/>
         </a:solidFill>
@@ -411,8 +413,8 @@
         <a:cs typeface="+mn-cs"/>
       </a:defRPr>
     </a:lvl4pPr>
-    <a:lvl5pPr marL="1828800" algn="l" defTabSz="914400" rtl="0" eaLnBrk="1" latinLnBrk="0" hangingPunct="1">
-      <a:defRPr sz="1200" kern="1200">
+    <a:lvl5pPr marL="1589593" algn="l" defTabSz="794796" rtl="0" eaLnBrk="1" latinLnBrk="0" hangingPunct="1">
+      <a:defRPr sz="1043" kern="1200">
         <a:solidFill>
           <a:schemeClr val="tx1"/>
         </a:solidFill>
@@ -421,8 +423,8 @@
         <a:cs typeface="+mn-cs"/>
       </a:defRPr>
     </a:lvl5pPr>
-    <a:lvl6pPr marL="2286000" algn="l" defTabSz="914400" rtl="0" eaLnBrk="1" latinLnBrk="0" hangingPunct="1">
-      <a:defRPr sz="1200" kern="1200">
+    <a:lvl6pPr marL="1986991" algn="l" defTabSz="794796" rtl="0" eaLnBrk="1" latinLnBrk="0" hangingPunct="1">
+      <a:defRPr sz="1043" kern="1200">
         <a:solidFill>
           <a:schemeClr val="tx1"/>
         </a:solidFill>
@@ -431,8 +433,8 @@
         <a:cs typeface="+mn-cs"/>
       </a:defRPr>
     </a:lvl6pPr>
-    <a:lvl7pPr marL="2743200" algn="l" defTabSz="914400" rtl="0" eaLnBrk="1" latinLnBrk="0" hangingPunct="1">
-      <a:defRPr sz="1200" kern="1200">
+    <a:lvl7pPr marL="2384389" algn="l" defTabSz="794796" rtl="0" eaLnBrk="1" latinLnBrk="0" hangingPunct="1">
+      <a:defRPr sz="1043" kern="1200">
         <a:solidFill>
           <a:schemeClr val="tx1"/>
         </a:solidFill>
@@ -441,8 +443,8 @@
         <a:cs typeface="+mn-cs"/>
       </a:defRPr>
     </a:lvl7pPr>
-    <a:lvl8pPr marL="3200400" algn="l" defTabSz="914400" rtl="0" eaLnBrk="1" latinLnBrk="0" hangingPunct="1">
-      <a:defRPr sz="1200" kern="1200">
+    <a:lvl8pPr marL="2781788" algn="l" defTabSz="794796" rtl="0" eaLnBrk="1" latinLnBrk="0" hangingPunct="1">
+      <a:defRPr sz="1043" kern="1200">
         <a:solidFill>
           <a:schemeClr val="tx1"/>
         </a:solidFill>
@@ -451,8 +453,8 @@
         <a:cs typeface="+mn-cs"/>
       </a:defRPr>
     </a:lvl8pPr>
-    <a:lvl9pPr marL="3657600" algn="l" defTabSz="914400" rtl="0" eaLnBrk="1" latinLnBrk="0" hangingPunct="1">
-      <a:defRPr sz="1200" kern="1200">
+    <a:lvl9pPr marL="3179186" algn="l" defTabSz="794796" rtl="0" eaLnBrk="1" latinLnBrk="0" hangingPunct="1">
+      <a:defRPr sz="1043" kern="1200">
         <a:solidFill>
           <a:schemeClr val="tx1"/>
         </a:solidFill>
@@ -492,7 +494,12 @@
             <p:ph type="sldImg"/>
           </p:nvPr>
         </p:nvSpPr>
-        <p:spPr/>
+        <p:spPr>
+          <a:xfrm>
+            <a:off x="536575" y="1143000"/>
+            <a:ext cx="5784850" cy="3086100"/>
+          </a:xfrm>
+        </p:spPr>
       </p:sp>
       <p:sp>
         <p:nvSpPr>
@@ -568,13 +575,7 @@
       </p:grpSpPr>
       <p:sp>
         <p:nvSpPr>
-          <p:cNvPr id="2" name="Title 1">
-            <a:extLst>
-              <a:ext uri="{FF2B5EF4-FFF2-40B4-BE49-F238E27FC236}">
-                <a16:creationId xmlns:a16="http://schemas.microsoft.com/office/drawing/2014/main" id="{98C761D1-45BC-9C35-92F2-4B41EC23627A}"/>
-              </a:ext>
-            </a:extLst>
-          </p:cNvPr>
+          <p:cNvPr id="2" name="Title 1"/>
           <p:cNvSpPr>
             <a:spLocks noGrp="1"/>
           </p:cNvSpPr>
@@ -584,15 +585,15 @@
         </p:nvSpPr>
         <p:spPr>
           <a:xfrm>
-            <a:off x="1524000" y="1122363"/>
-            <a:ext cx="9144000" cy="2387600"/>
+            <a:off x="1349971" y="942577"/>
+            <a:ext cx="8099822" cy="2005142"/>
           </a:xfrm>
         </p:spPr>
         <p:txBody>
           <a:bodyPr anchor="b"/>
           <a:lstStyle>
             <a:lvl1pPr algn="ctr">
-              <a:defRPr sz="6000"/>
+              <a:defRPr sz="5039"/>
             </a:lvl1pPr>
           </a:lstStyle>
           <a:p>
@@ -600,19 +601,13 @@
               <a:rPr lang="en-US"/>
               <a:t>Click to edit Master title style</a:t>
             </a:r>
-            <a:endParaRPr lang="en-CA"/>
-          </a:p>
-        </p:txBody>
-      </p:sp>
-      <p:sp>
-        <p:nvSpPr>
-          <p:cNvPr id="3" name="Subtitle 2">
-            <a:extLst>
-              <a:ext uri="{FF2B5EF4-FFF2-40B4-BE49-F238E27FC236}">
-                <a16:creationId xmlns:a16="http://schemas.microsoft.com/office/drawing/2014/main" id="{7DCCB4CE-40C5-BFA0-3DA0-9A109A955DF7}"/>
-              </a:ext>
-            </a:extLst>
-          </p:cNvPr>
+            <a:endParaRPr lang="en-US" dirty="0"/>
+          </a:p>
+        </p:txBody>
+      </p:sp>
+      <p:sp>
+        <p:nvSpPr>
+          <p:cNvPr id="3" name="Subtitle 2"/>
           <p:cNvSpPr>
             <a:spLocks noGrp="1"/>
           </p:cNvSpPr>
@@ -622,8 +617,8 @@
         </p:nvSpPr>
         <p:spPr>
           <a:xfrm>
-            <a:off x="1524000" y="3602038"/>
-            <a:ext cx="9144000" cy="1655762"/>
+            <a:off x="1349971" y="3025045"/>
+            <a:ext cx="8099822" cy="1390533"/>
           </a:xfrm>
         </p:spPr>
         <p:txBody>
@@ -631,39 +626,39 @@
           <a:lstStyle>
             <a:lvl1pPr marL="0" indent="0" algn="ctr">
               <a:buNone/>
-              <a:defRPr sz="2400"/>
+              <a:defRPr sz="2016"/>
             </a:lvl1pPr>
-            <a:lvl2pPr marL="457200" indent="0" algn="ctr">
-              <a:buNone/>
-              <a:defRPr sz="2000"/>
+            <a:lvl2pPr marL="383957" indent="0" algn="ctr">
+              <a:buNone/>
+              <a:defRPr sz="1680"/>
             </a:lvl2pPr>
-            <a:lvl3pPr marL="914400" indent="0" algn="ctr">
-              <a:buNone/>
-              <a:defRPr sz="1800"/>
+            <a:lvl3pPr marL="767913" indent="0" algn="ctr">
+              <a:buNone/>
+              <a:defRPr sz="1512"/>
             </a:lvl3pPr>
-            <a:lvl4pPr marL="1371600" indent="0" algn="ctr">
-              <a:buNone/>
-              <a:defRPr sz="1600"/>
+            <a:lvl4pPr marL="1151870" indent="0" algn="ctr">
+              <a:buNone/>
+              <a:defRPr sz="1344"/>
             </a:lvl4pPr>
-            <a:lvl5pPr marL="1828800" indent="0" algn="ctr">
-              <a:buNone/>
-              <a:defRPr sz="1600"/>
+            <a:lvl5pPr marL="1535826" indent="0" algn="ctr">
+              <a:buNone/>
+              <a:defRPr sz="1344"/>
             </a:lvl5pPr>
-            <a:lvl6pPr marL="2286000" indent="0" algn="ctr">
-              <a:buNone/>
-              <a:defRPr sz="1600"/>
+            <a:lvl6pPr marL="1919783" indent="0" algn="ctr">
+              <a:buNone/>
+              <a:defRPr sz="1344"/>
             </a:lvl6pPr>
-            <a:lvl7pPr marL="2743200" indent="0" algn="ctr">
-              <a:buNone/>
-              <a:defRPr sz="1600"/>
+            <a:lvl7pPr marL="2303739" indent="0" algn="ctr">
+              <a:buNone/>
+              <a:defRPr sz="1344"/>
             </a:lvl7pPr>
-            <a:lvl8pPr marL="3200400" indent="0" algn="ctr">
-              <a:buNone/>
-              <a:defRPr sz="1600"/>
+            <a:lvl8pPr marL="2687696" indent="0" algn="ctr">
+              <a:buNone/>
+              <a:defRPr sz="1344"/>
             </a:lvl8pPr>
-            <a:lvl9pPr marL="3657600" indent="0" algn="ctr">
-              <a:buNone/>
-              <a:defRPr sz="1600"/>
+            <a:lvl9pPr marL="3071652" indent="0" algn="ctr">
+              <a:buNone/>
+              <a:defRPr sz="1344"/>
             </a:lvl9pPr>
           </a:lstStyle>
           <a:p>
@@ -671,19 +666,13 @@
               <a:rPr lang="en-US"/>
               <a:t>Click to edit Master subtitle style</a:t>
             </a:r>
-            <a:endParaRPr lang="en-CA"/>
-          </a:p>
-        </p:txBody>
-      </p:sp>
-      <p:sp>
-        <p:nvSpPr>
-          <p:cNvPr id="4" name="Date Placeholder 3">
-            <a:extLst>
-              <a:ext uri="{FF2B5EF4-FFF2-40B4-BE49-F238E27FC236}">
-                <a16:creationId xmlns:a16="http://schemas.microsoft.com/office/drawing/2014/main" id="{08A65D40-EFAA-B832-0BBB-EAE11BAF46D1}"/>
-              </a:ext>
-            </a:extLst>
-          </p:cNvPr>
+            <a:endParaRPr lang="en-US" dirty="0"/>
+          </a:p>
+        </p:txBody>
+      </p:sp>
+      <p:sp>
+        <p:nvSpPr>
+          <p:cNvPr id="4" name="Date Placeholder 3"/>
           <p:cNvSpPr>
             <a:spLocks noGrp="1"/>
           </p:cNvSpPr>
@@ -698,7 +687,7 @@
           <a:p>
             <a:fld id="{5899F6B3-811F-4FB0-8A8F-1ECB6174A6D5}" type="datetimeFigureOut">
               <a:rPr lang="en-CA" smtClean="0"/>
-              <a:t>2025-07-24</a:t>
+              <a:t>2025-08-22</a:t>
             </a:fld>
             <a:endParaRPr lang="en-CA"/>
           </a:p>
@@ -706,13 +695,7 @@
       </p:sp>
       <p:sp>
         <p:nvSpPr>
-          <p:cNvPr id="5" name="Footer Placeholder 4">
-            <a:extLst>
-              <a:ext uri="{FF2B5EF4-FFF2-40B4-BE49-F238E27FC236}">
-                <a16:creationId xmlns:a16="http://schemas.microsoft.com/office/drawing/2014/main" id="{3172D561-6BB8-DE13-6BAE-25BDAF5A66C5}"/>
-              </a:ext>
-            </a:extLst>
-          </p:cNvPr>
+          <p:cNvPr id="5" name="Footer Placeholder 4"/>
           <p:cNvSpPr>
             <a:spLocks noGrp="1"/>
           </p:cNvSpPr>
@@ -731,13 +714,7 @@
       </p:sp>
       <p:sp>
         <p:nvSpPr>
-          <p:cNvPr id="6" name="Slide Number Placeholder 5">
-            <a:extLst>
-              <a:ext uri="{FF2B5EF4-FFF2-40B4-BE49-F238E27FC236}">
-                <a16:creationId xmlns:a16="http://schemas.microsoft.com/office/drawing/2014/main" id="{5F9B95F1-9D20-2FA2-8576-795EA316B066}"/>
-              </a:ext>
-            </a:extLst>
-          </p:cNvPr>
+          <p:cNvPr id="6" name="Slide Number Placeholder 5"/>
           <p:cNvSpPr>
             <a:spLocks noGrp="1"/>
           </p:cNvSpPr>
@@ -761,7 +738,7 @@
     </p:spTree>
     <p:extLst>
       <p:ext uri="{BB962C8B-B14F-4D97-AF65-F5344CB8AC3E}">
-        <p14:creationId xmlns:p14="http://schemas.microsoft.com/office/powerpoint/2010/main" val="1625451911"/>
+        <p14:creationId xmlns:p14="http://schemas.microsoft.com/office/powerpoint/2010/main" val="209578686"/>
       </p:ext>
     </p:extLst>
   </p:cSld>
@@ -790,13 +767,7 @@
       </p:grpSpPr>
       <p:sp>
         <p:nvSpPr>
-          <p:cNvPr id="2" name="Title 1">
-            <a:extLst>
-              <a:ext uri="{FF2B5EF4-FFF2-40B4-BE49-F238E27FC236}">
-                <a16:creationId xmlns:a16="http://schemas.microsoft.com/office/drawing/2014/main" id="{E75D8793-B339-CAA2-88F4-C34EF8B38272}"/>
-              </a:ext>
-            </a:extLst>
-          </p:cNvPr>
+          <p:cNvPr id="2" name="Title 1"/>
           <p:cNvSpPr>
             <a:spLocks noGrp="1"/>
           </p:cNvSpPr>
@@ -813,19 +784,13 @@
               <a:rPr lang="en-US"/>
               <a:t>Click to edit Master title style</a:t>
             </a:r>
-            <a:endParaRPr lang="en-CA"/>
-          </a:p>
-        </p:txBody>
-      </p:sp>
-      <p:sp>
-        <p:nvSpPr>
-          <p:cNvPr id="3" name="Vertical Text Placeholder 2">
-            <a:extLst>
-              <a:ext uri="{FF2B5EF4-FFF2-40B4-BE49-F238E27FC236}">
-                <a16:creationId xmlns:a16="http://schemas.microsoft.com/office/drawing/2014/main" id="{F72097AC-13C2-AB4D-41BA-38B3FE8FCE9C}"/>
-              </a:ext>
-            </a:extLst>
-          </p:cNvPr>
+            <a:endParaRPr lang="en-US" dirty="0"/>
+          </a:p>
+        </p:txBody>
+      </p:sp>
+      <p:sp>
+        <p:nvSpPr>
+          <p:cNvPr id="3" name="Vertical Text Placeholder 2"/>
           <p:cNvSpPr>
             <a:spLocks noGrp="1"/>
           </p:cNvSpPr>
@@ -871,19 +836,13 @@
               <a:rPr lang="en-US"/>
               <a:t>Fifth level</a:t>
             </a:r>
-            <a:endParaRPr lang="en-CA"/>
-          </a:p>
-        </p:txBody>
-      </p:sp>
-      <p:sp>
-        <p:nvSpPr>
-          <p:cNvPr id="4" name="Date Placeholder 3">
-            <a:extLst>
-              <a:ext uri="{FF2B5EF4-FFF2-40B4-BE49-F238E27FC236}">
-                <a16:creationId xmlns:a16="http://schemas.microsoft.com/office/drawing/2014/main" id="{1B463521-57F1-53F5-3EE9-1A386CF49238}"/>
-              </a:ext>
-            </a:extLst>
-          </p:cNvPr>
+            <a:endParaRPr lang="en-US" dirty="0"/>
+          </a:p>
+        </p:txBody>
+      </p:sp>
+      <p:sp>
+        <p:nvSpPr>
+          <p:cNvPr id="4" name="Date Placeholder 3"/>
           <p:cNvSpPr>
             <a:spLocks noGrp="1"/>
           </p:cNvSpPr>
@@ -898,7 +857,7 @@
           <a:p>
             <a:fld id="{5899F6B3-811F-4FB0-8A8F-1ECB6174A6D5}" type="datetimeFigureOut">
               <a:rPr lang="en-CA" smtClean="0"/>
-              <a:t>2025-07-24</a:t>
+              <a:t>2025-08-22</a:t>
             </a:fld>
             <a:endParaRPr lang="en-CA"/>
           </a:p>
@@ -906,13 +865,7 @@
       </p:sp>
       <p:sp>
         <p:nvSpPr>
-          <p:cNvPr id="5" name="Footer Placeholder 4">
-            <a:extLst>
-              <a:ext uri="{FF2B5EF4-FFF2-40B4-BE49-F238E27FC236}">
-                <a16:creationId xmlns:a16="http://schemas.microsoft.com/office/drawing/2014/main" id="{6BFA0FA2-5F39-C10A-9A0B-923B9018BD29}"/>
-              </a:ext>
-            </a:extLst>
-          </p:cNvPr>
+          <p:cNvPr id="5" name="Footer Placeholder 4"/>
           <p:cNvSpPr>
             <a:spLocks noGrp="1"/>
           </p:cNvSpPr>
@@ -931,13 +884,7 @@
       </p:sp>
       <p:sp>
         <p:nvSpPr>
-          <p:cNvPr id="6" name="Slide Number Placeholder 5">
-            <a:extLst>
-              <a:ext uri="{FF2B5EF4-FFF2-40B4-BE49-F238E27FC236}">
-                <a16:creationId xmlns:a16="http://schemas.microsoft.com/office/drawing/2014/main" id="{93EFBA61-A51F-0E1D-E1B2-4879011669BF}"/>
-              </a:ext>
-            </a:extLst>
-          </p:cNvPr>
+          <p:cNvPr id="6" name="Slide Number Placeholder 5"/>
           <p:cNvSpPr>
             <a:spLocks noGrp="1"/>
           </p:cNvSpPr>
@@ -961,7 +908,7 @@
     </p:spTree>
     <p:extLst>
       <p:ext uri="{BB962C8B-B14F-4D97-AF65-F5344CB8AC3E}">
-        <p14:creationId xmlns:p14="http://schemas.microsoft.com/office/powerpoint/2010/main" val="1842832339"/>
+        <p14:creationId xmlns:p14="http://schemas.microsoft.com/office/powerpoint/2010/main" val="689067700"/>
       </p:ext>
     </p:extLst>
   </p:cSld>
@@ -990,13 +937,7 @@
       </p:grpSpPr>
       <p:sp>
         <p:nvSpPr>
-          <p:cNvPr id="2" name="Vertical Title 1">
-            <a:extLst>
-              <a:ext uri="{FF2B5EF4-FFF2-40B4-BE49-F238E27FC236}">
-                <a16:creationId xmlns:a16="http://schemas.microsoft.com/office/drawing/2014/main" id="{F6440C6C-AE64-792B-55FA-6DEED6CA1CF0}"/>
-              </a:ext>
-            </a:extLst>
-          </p:cNvPr>
+          <p:cNvPr id="2" name="Vertical Title 1"/>
           <p:cNvSpPr>
             <a:spLocks noGrp="1"/>
           </p:cNvSpPr>
@@ -1006,8 +947,8 @@
         </p:nvSpPr>
         <p:spPr>
           <a:xfrm>
-            <a:off x="8724900" y="365125"/>
-            <a:ext cx="2628900" cy="5811838"/>
+            <a:off x="7728580" y="306637"/>
+            <a:ext cx="2328699" cy="4880868"/>
           </a:xfrm>
         </p:spPr>
         <p:txBody>
@@ -1018,19 +959,13 @@
               <a:rPr lang="en-US"/>
               <a:t>Click to edit Master title style</a:t>
             </a:r>
-            <a:endParaRPr lang="en-CA"/>
-          </a:p>
-        </p:txBody>
-      </p:sp>
-      <p:sp>
-        <p:nvSpPr>
-          <p:cNvPr id="3" name="Vertical Text Placeholder 2">
-            <a:extLst>
-              <a:ext uri="{FF2B5EF4-FFF2-40B4-BE49-F238E27FC236}">
-                <a16:creationId xmlns:a16="http://schemas.microsoft.com/office/drawing/2014/main" id="{C9A61A64-A124-E537-AD6A-ED39297EFEBA}"/>
-              </a:ext>
-            </a:extLst>
-          </p:cNvPr>
+            <a:endParaRPr lang="en-US" dirty="0"/>
+          </a:p>
+        </p:txBody>
+      </p:sp>
+      <p:sp>
+        <p:nvSpPr>
+          <p:cNvPr id="3" name="Vertical Text Placeholder 2"/>
           <p:cNvSpPr>
             <a:spLocks noGrp="1"/>
           </p:cNvSpPr>
@@ -1040,8 +975,8 @@
         </p:nvSpPr>
         <p:spPr>
           <a:xfrm>
-            <a:off x="838200" y="365125"/>
-            <a:ext cx="7734300" cy="5811838"/>
+            <a:off x="742484" y="306637"/>
+            <a:ext cx="6851100" cy="4880868"/>
           </a:xfrm>
         </p:spPr>
         <p:txBody>
@@ -1081,19 +1016,13 @@
               <a:rPr lang="en-US"/>
               <a:t>Fifth level</a:t>
             </a:r>
-            <a:endParaRPr lang="en-CA"/>
-          </a:p>
-        </p:txBody>
-      </p:sp>
-      <p:sp>
-        <p:nvSpPr>
-          <p:cNvPr id="4" name="Date Placeholder 3">
-            <a:extLst>
-              <a:ext uri="{FF2B5EF4-FFF2-40B4-BE49-F238E27FC236}">
-                <a16:creationId xmlns:a16="http://schemas.microsoft.com/office/drawing/2014/main" id="{F8D8192E-D767-9CC4-B454-B77A662D2C85}"/>
-              </a:ext>
-            </a:extLst>
-          </p:cNvPr>
+            <a:endParaRPr lang="en-US" dirty="0"/>
+          </a:p>
+        </p:txBody>
+      </p:sp>
+      <p:sp>
+        <p:nvSpPr>
+          <p:cNvPr id="4" name="Date Placeholder 3"/>
           <p:cNvSpPr>
             <a:spLocks noGrp="1"/>
           </p:cNvSpPr>
@@ -1108,7 +1037,7 @@
           <a:p>
             <a:fld id="{5899F6B3-811F-4FB0-8A8F-1ECB6174A6D5}" type="datetimeFigureOut">
               <a:rPr lang="en-CA" smtClean="0"/>
-              <a:t>2025-07-24</a:t>
+              <a:t>2025-08-22</a:t>
             </a:fld>
             <a:endParaRPr lang="en-CA"/>
           </a:p>
@@ -1116,13 +1045,7 @@
       </p:sp>
       <p:sp>
         <p:nvSpPr>
-          <p:cNvPr id="5" name="Footer Placeholder 4">
-            <a:extLst>
-              <a:ext uri="{FF2B5EF4-FFF2-40B4-BE49-F238E27FC236}">
-                <a16:creationId xmlns:a16="http://schemas.microsoft.com/office/drawing/2014/main" id="{0B54C8E7-8F7D-EC5F-3C75-98ED97C9E028}"/>
-              </a:ext>
-            </a:extLst>
-          </p:cNvPr>
+          <p:cNvPr id="5" name="Footer Placeholder 4"/>
           <p:cNvSpPr>
             <a:spLocks noGrp="1"/>
           </p:cNvSpPr>
@@ -1141,13 +1064,7 @@
       </p:sp>
       <p:sp>
         <p:nvSpPr>
-          <p:cNvPr id="6" name="Slide Number Placeholder 5">
-            <a:extLst>
-              <a:ext uri="{FF2B5EF4-FFF2-40B4-BE49-F238E27FC236}">
-                <a16:creationId xmlns:a16="http://schemas.microsoft.com/office/drawing/2014/main" id="{1181DBC4-0CAD-A263-1513-4298373BF3A6}"/>
-              </a:ext>
-            </a:extLst>
-          </p:cNvPr>
+          <p:cNvPr id="6" name="Slide Number Placeholder 5"/>
           <p:cNvSpPr>
             <a:spLocks noGrp="1"/>
           </p:cNvSpPr>
@@ -1171,7 +1088,7 @@
     </p:spTree>
     <p:extLst>
       <p:ext uri="{BB962C8B-B14F-4D97-AF65-F5344CB8AC3E}">
-        <p14:creationId xmlns:p14="http://schemas.microsoft.com/office/powerpoint/2010/main" val="2836709213"/>
+        <p14:creationId xmlns:p14="http://schemas.microsoft.com/office/powerpoint/2010/main" val="952678021"/>
       </p:ext>
     </p:extLst>
   </p:cSld>
@@ -1200,13 +1117,7 @@
       </p:grpSpPr>
       <p:sp>
         <p:nvSpPr>
-          <p:cNvPr id="2" name="Title 1">
-            <a:extLst>
-              <a:ext uri="{FF2B5EF4-FFF2-40B4-BE49-F238E27FC236}">
-                <a16:creationId xmlns:a16="http://schemas.microsoft.com/office/drawing/2014/main" id="{86995088-6A22-1999-B106-A84D5A402693}"/>
-              </a:ext>
-            </a:extLst>
-          </p:cNvPr>
+          <p:cNvPr id="2" name="Title 1"/>
           <p:cNvSpPr>
             <a:spLocks noGrp="1"/>
           </p:cNvSpPr>
@@ -1223,19 +1134,13 @@
               <a:rPr lang="en-US"/>
               <a:t>Click to edit Master title style</a:t>
             </a:r>
-            <a:endParaRPr lang="en-CA"/>
-          </a:p>
-        </p:txBody>
-      </p:sp>
-      <p:sp>
-        <p:nvSpPr>
-          <p:cNvPr id="3" name="Content Placeholder 2">
-            <a:extLst>
-              <a:ext uri="{FF2B5EF4-FFF2-40B4-BE49-F238E27FC236}">
-                <a16:creationId xmlns:a16="http://schemas.microsoft.com/office/drawing/2014/main" id="{78DC3CAF-FABC-59B0-BF25-1C8EC147A17E}"/>
-              </a:ext>
-            </a:extLst>
-          </p:cNvPr>
+            <a:endParaRPr lang="en-US" dirty="0"/>
+          </a:p>
+        </p:txBody>
+      </p:sp>
+      <p:sp>
+        <p:nvSpPr>
+          <p:cNvPr id="3" name="Content Placeholder 2"/>
           <p:cNvSpPr>
             <a:spLocks noGrp="1"/>
           </p:cNvSpPr>
@@ -1281,19 +1186,13 @@
               <a:rPr lang="en-US"/>
               <a:t>Fifth level</a:t>
             </a:r>
-            <a:endParaRPr lang="en-CA"/>
-          </a:p>
-        </p:txBody>
-      </p:sp>
-      <p:sp>
-        <p:nvSpPr>
-          <p:cNvPr id="4" name="Date Placeholder 3">
-            <a:extLst>
-              <a:ext uri="{FF2B5EF4-FFF2-40B4-BE49-F238E27FC236}">
-                <a16:creationId xmlns:a16="http://schemas.microsoft.com/office/drawing/2014/main" id="{5AB10443-F566-887B-20DE-838EB1609EB3}"/>
-              </a:ext>
-            </a:extLst>
-          </p:cNvPr>
+            <a:endParaRPr lang="en-US" dirty="0"/>
+          </a:p>
+        </p:txBody>
+      </p:sp>
+      <p:sp>
+        <p:nvSpPr>
+          <p:cNvPr id="4" name="Date Placeholder 3"/>
           <p:cNvSpPr>
             <a:spLocks noGrp="1"/>
           </p:cNvSpPr>
@@ -1308,7 +1207,7 @@
           <a:p>
             <a:fld id="{5899F6B3-811F-4FB0-8A8F-1ECB6174A6D5}" type="datetimeFigureOut">
               <a:rPr lang="en-CA" smtClean="0"/>
-              <a:t>2025-07-24</a:t>
+              <a:t>2025-08-22</a:t>
             </a:fld>
             <a:endParaRPr lang="en-CA"/>
           </a:p>
@@ -1316,13 +1215,7 @@
       </p:sp>
       <p:sp>
         <p:nvSpPr>
-          <p:cNvPr id="5" name="Footer Placeholder 4">
-            <a:extLst>
-              <a:ext uri="{FF2B5EF4-FFF2-40B4-BE49-F238E27FC236}">
-                <a16:creationId xmlns:a16="http://schemas.microsoft.com/office/drawing/2014/main" id="{CA81B1A4-F02A-CFA6-FE32-8D0C965A67C3}"/>
-              </a:ext>
-            </a:extLst>
-          </p:cNvPr>
+          <p:cNvPr id="5" name="Footer Placeholder 4"/>
           <p:cNvSpPr>
             <a:spLocks noGrp="1"/>
           </p:cNvSpPr>
@@ -1341,13 +1234,7 @@
       </p:sp>
       <p:sp>
         <p:nvSpPr>
-          <p:cNvPr id="6" name="Slide Number Placeholder 5">
-            <a:extLst>
-              <a:ext uri="{FF2B5EF4-FFF2-40B4-BE49-F238E27FC236}">
-                <a16:creationId xmlns:a16="http://schemas.microsoft.com/office/drawing/2014/main" id="{40DB638E-138D-EA30-793F-E9B02258FBAA}"/>
-              </a:ext>
-            </a:extLst>
-          </p:cNvPr>
+          <p:cNvPr id="6" name="Slide Number Placeholder 5"/>
           <p:cNvSpPr>
             <a:spLocks noGrp="1"/>
           </p:cNvSpPr>
@@ -1371,7 +1258,7 @@
     </p:spTree>
     <p:extLst>
       <p:ext uri="{BB962C8B-B14F-4D97-AF65-F5344CB8AC3E}">
-        <p14:creationId xmlns:p14="http://schemas.microsoft.com/office/powerpoint/2010/main" val="3205457932"/>
+        <p14:creationId xmlns:p14="http://schemas.microsoft.com/office/powerpoint/2010/main" val="1998784941"/>
       </p:ext>
     </p:extLst>
   </p:cSld>
@@ -1400,13 +1287,7 @@
       </p:grpSpPr>
       <p:sp>
         <p:nvSpPr>
-          <p:cNvPr id="2" name="Title 1">
-            <a:extLst>
-              <a:ext uri="{FF2B5EF4-FFF2-40B4-BE49-F238E27FC236}">
-                <a16:creationId xmlns:a16="http://schemas.microsoft.com/office/drawing/2014/main" id="{8A18EE98-7EF8-20A9-DB05-C8F442E6EE88}"/>
-              </a:ext>
-            </a:extLst>
-          </p:cNvPr>
+          <p:cNvPr id="2" name="Title 1"/>
           <p:cNvSpPr>
             <a:spLocks noGrp="1"/>
           </p:cNvSpPr>
@@ -1416,15 +1297,15 @@
         </p:nvSpPr>
         <p:spPr>
           <a:xfrm>
-            <a:off x="831850" y="1709738"/>
-            <a:ext cx="10515600" cy="2852737"/>
+            <a:off x="736859" y="1435864"/>
+            <a:ext cx="9314796" cy="2395771"/>
           </a:xfrm>
         </p:spPr>
         <p:txBody>
           <a:bodyPr anchor="b"/>
           <a:lstStyle>
             <a:lvl1pPr>
-              <a:defRPr sz="6000"/>
+              <a:defRPr sz="5039"/>
             </a:lvl1pPr>
           </a:lstStyle>
           <a:p>
@@ -1432,19 +1313,13 @@
               <a:rPr lang="en-US"/>
               <a:t>Click to edit Master title style</a:t>
             </a:r>
-            <a:endParaRPr lang="en-CA"/>
-          </a:p>
-        </p:txBody>
-      </p:sp>
-      <p:sp>
-        <p:nvSpPr>
-          <p:cNvPr id="3" name="Text Placeholder 2">
-            <a:extLst>
-              <a:ext uri="{FF2B5EF4-FFF2-40B4-BE49-F238E27FC236}">
-                <a16:creationId xmlns:a16="http://schemas.microsoft.com/office/drawing/2014/main" id="{C0B81119-E6B6-D0F9-14E6-5DD15B9F25AE}"/>
-              </a:ext>
-            </a:extLst>
-          </p:cNvPr>
+            <a:endParaRPr lang="en-US" dirty="0"/>
+          </a:p>
+        </p:txBody>
+      </p:sp>
+      <p:sp>
+        <p:nvSpPr>
+          <p:cNvPr id="3" name="Text Placeholder 2"/>
           <p:cNvSpPr>
             <a:spLocks noGrp="1"/>
           </p:cNvSpPr>
@@ -1454,8 +1329,8 @@
         </p:nvSpPr>
         <p:spPr>
           <a:xfrm>
-            <a:off x="831850" y="4589463"/>
-            <a:ext cx="10515600" cy="1500187"/>
+            <a:off x="736859" y="3854300"/>
+            <a:ext cx="9314796" cy="1259879"/>
           </a:xfrm>
         </p:spPr>
         <p:txBody>
@@ -1463,7 +1338,7 @@
           <a:lstStyle>
             <a:lvl1pPr marL="0" indent="0">
               <a:buNone/>
-              <a:defRPr sz="2400">
+              <a:defRPr sz="2016">
                 <a:solidFill>
                   <a:schemeClr val="tx1">
                     <a:tint val="82000"/>
@@ -1471,9 +1346,9 @@
                 </a:solidFill>
               </a:defRPr>
             </a:lvl1pPr>
-            <a:lvl2pPr marL="457200" indent="0">
-              <a:buNone/>
-              <a:defRPr sz="2000">
+            <a:lvl2pPr marL="383957" indent="0">
+              <a:buNone/>
+              <a:defRPr sz="1680">
                 <a:solidFill>
                   <a:schemeClr val="tx1">
                     <a:tint val="82000"/>
@@ -1481,9 +1356,9 @@
                 </a:solidFill>
               </a:defRPr>
             </a:lvl2pPr>
-            <a:lvl3pPr marL="914400" indent="0">
-              <a:buNone/>
-              <a:defRPr sz="1800">
+            <a:lvl3pPr marL="767913" indent="0">
+              <a:buNone/>
+              <a:defRPr sz="1512">
                 <a:solidFill>
                   <a:schemeClr val="tx1">
                     <a:tint val="82000"/>
@@ -1491,9 +1366,9 @@
                 </a:solidFill>
               </a:defRPr>
             </a:lvl3pPr>
-            <a:lvl4pPr marL="1371600" indent="0">
-              <a:buNone/>
-              <a:defRPr sz="1600">
+            <a:lvl4pPr marL="1151870" indent="0">
+              <a:buNone/>
+              <a:defRPr sz="1344">
                 <a:solidFill>
                   <a:schemeClr val="tx1">
                     <a:tint val="82000"/>
@@ -1501,9 +1376,9 @@
                 </a:solidFill>
               </a:defRPr>
             </a:lvl4pPr>
-            <a:lvl5pPr marL="1828800" indent="0">
-              <a:buNone/>
-              <a:defRPr sz="1600">
+            <a:lvl5pPr marL="1535826" indent="0">
+              <a:buNone/>
+              <a:defRPr sz="1344">
                 <a:solidFill>
                   <a:schemeClr val="tx1">
                     <a:tint val="82000"/>
@@ -1511,9 +1386,9 @@
                 </a:solidFill>
               </a:defRPr>
             </a:lvl5pPr>
-            <a:lvl6pPr marL="2286000" indent="0">
-              <a:buNone/>
-              <a:defRPr sz="1600">
+            <a:lvl6pPr marL="1919783" indent="0">
+              <a:buNone/>
+              <a:defRPr sz="1344">
                 <a:solidFill>
                   <a:schemeClr val="tx1">
                     <a:tint val="82000"/>
@@ -1521,9 +1396,9 @@
                 </a:solidFill>
               </a:defRPr>
             </a:lvl6pPr>
-            <a:lvl7pPr marL="2743200" indent="0">
-              <a:buNone/>
-              <a:defRPr sz="1600">
+            <a:lvl7pPr marL="2303739" indent="0">
+              <a:buNone/>
+              <a:defRPr sz="1344">
                 <a:solidFill>
                   <a:schemeClr val="tx1">
                     <a:tint val="82000"/>
@@ -1531,9 +1406,9 @@
                 </a:solidFill>
               </a:defRPr>
             </a:lvl7pPr>
-            <a:lvl8pPr marL="3200400" indent="0">
-              <a:buNone/>
-              <a:defRPr sz="1600">
+            <a:lvl8pPr marL="2687696" indent="0">
+              <a:buNone/>
+              <a:defRPr sz="1344">
                 <a:solidFill>
                   <a:schemeClr val="tx1">
                     <a:tint val="82000"/>
@@ -1541,9 +1416,9 @@
                 </a:solidFill>
               </a:defRPr>
             </a:lvl8pPr>
-            <a:lvl9pPr marL="3657600" indent="0">
-              <a:buNone/>
-              <a:defRPr sz="1600">
+            <a:lvl9pPr marL="3071652" indent="0">
+              <a:buNone/>
+              <a:defRPr sz="1344">
                 <a:solidFill>
                   <a:schemeClr val="tx1">
                     <a:tint val="82000"/>
@@ -1563,13 +1438,7 @@
       </p:sp>
       <p:sp>
         <p:nvSpPr>
-          <p:cNvPr id="4" name="Date Placeholder 3">
-            <a:extLst>
-              <a:ext uri="{FF2B5EF4-FFF2-40B4-BE49-F238E27FC236}">
-                <a16:creationId xmlns:a16="http://schemas.microsoft.com/office/drawing/2014/main" id="{67AF7A8B-CA00-A09D-AB22-F63CEBD2B001}"/>
-              </a:ext>
-            </a:extLst>
-          </p:cNvPr>
+          <p:cNvPr id="4" name="Date Placeholder 3"/>
           <p:cNvSpPr>
             <a:spLocks noGrp="1"/>
           </p:cNvSpPr>
@@ -1584,7 +1453,7 @@
           <a:p>
             <a:fld id="{5899F6B3-811F-4FB0-8A8F-1ECB6174A6D5}" type="datetimeFigureOut">
               <a:rPr lang="en-CA" smtClean="0"/>
-              <a:t>2025-07-24</a:t>
+              <a:t>2025-08-22</a:t>
             </a:fld>
             <a:endParaRPr lang="en-CA"/>
           </a:p>
@@ -1592,13 +1461,7 @@
       </p:sp>
       <p:sp>
         <p:nvSpPr>
-          <p:cNvPr id="5" name="Footer Placeholder 4">
-            <a:extLst>
-              <a:ext uri="{FF2B5EF4-FFF2-40B4-BE49-F238E27FC236}">
-                <a16:creationId xmlns:a16="http://schemas.microsoft.com/office/drawing/2014/main" id="{9F5785D5-A886-4635-2BCD-E84AD7128931}"/>
-              </a:ext>
-            </a:extLst>
-          </p:cNvPr>
+          <p:cNvPr id="5" name="Footer Placeholder 4"/>
           <p:cNvSpPr>
             <a:spLocks noGrp="1"/>
           </p:cNvSpPr>
@@ -1617,13 +1480,7 @@
       </p:sp>
       <p:sp>
         <p:nvSpPr>
-          <p:cNvPr id="6" name="Slide Number Placeholder 5">
-            <a:extLst>
-              <a:ext uri="{FF2B5EF4-FFF2-40B4-BE49-F238E27FC236}">
-                <a16:creationId xmlns:a16="http://schemas.microsoft.com/office/drawing/2014/main" id="{27452C2D-854F-1E50-6BB4-AC59E7C6769E}"/>
-              </a:ext>
-            </a:extLst>
-          </p:cNvPr>
+          <p:cNvPr id="6" name="Slide Number Placeholder 5"/>
           <p:cNvSpPr>
             <a:spLocks noGrp="1"/>
           </p:cNvSpPr>
@@ -1647,7 +1504,7 @@
     </p:spTree>
     <p:extLst>
       <p:ext uri="{BB962C8B-B14F-4D97-AF65-F5344CB8AC3E}">
-        <p14:creationId xmlns:p14="http://schemas.microsoft.com/office/powerpoint/2010/main" val="1072147619"/>
+        <p14:creationId xmlns:p14="http://schemas.microsoft.com/office/powerpoint/2010/main" val="1856344165"/>
       </p:ext>
     </p:extLst>
   </p:cSld>
@@ -1676,13 +1533,7 @@
       </p:grpSpPr>
       <p:sp>
         <p:nvSpPr>
-          <p:cNvPr id="2" name="Title 1">
-            <a:extLst>
-              <a:ext uri="{FF2B5EF4-FFF2-40B4-BE49-F238E27FC236}">
-                <a16:creationId xmlns:a16="http://schemas.microsoft.com/office/drawing/2014/main" id="{8F181344-DC27-CB7A-BF94-DB682780950D}"/>
-              </a:ext>
-            </a:extLst>
-          </p:cNvPr>
+          <p:cNvPr id="2" name="Title 1"/>
           <p:cNvSpPr>
             <a:spLocks noGrp="1"/>
           </p:cNvSpPr>
@@ -1699,19 +1550,13 @@
               <a:rPr lang="en-US"/>
               <a:t>Click to edit Master title style</a:t>
             </a:r>
-            <a:endParaRPr lang="en-CA"/>
-          </a:p>
-        </p:txBody>
-      </p:sp>
-      <p:sp>
-        <p:nvSpPr>
-          <p:cNvPr id="3" name="Content Placeholder 2">
-            <a:extLst>
-              <a:ext uri="{FF2B5EF4-FFF2-40B4-BE49-F238E27FC236}">
-                <a16:creationId xmlns:a16="http://schemas.microsoft.com/office/drawing/2014/main" id="{821D48AB-0274-0D4B-BD62-7142CE4C97C7}"/>
-              </a:ext>
-            </a:extLst>
-          </p:cNvPr>
+            <a:endParaRPr lang="en-US" dirty="0"/>
+          </a:p>
+        </p:txBody>
+      </p:sp>
+      <p:sp>
+        <p:nvSpPr>
+          <p:cNvPr id="3" name="Content Placeholder 2"/>
           <p:cNvSpPr>
             <a:spLocks noGrp="1"/>
           </p:cNvSpPr>
@@ -1721,8 +1566,8 @@
         </p:nvSpPr>
         <p:spPr>
           <a:xfrm>
-            <a:off x="838200" y="1825625"/>
-            <a:ext cx="5181600" cy="4351338"/>
+            <a:off x="742484" y="1533187"/>
+            <a:ext cx="4589899" cy="3654318"/>
           </a:xfrm>
         </p:spPr>
         <p:txBody>
@@ -1762,19 +1607,13 @@
               <a:rPr lang="en-US"/>
               <a:t>Fifth level</a:t>
             </a:r>
-            <a:endParaRPr lang="en-CA"/>
-          </a:p>
-        </p:txBody>
-      </p:sp>
-      <p:sp>
-        <p:nvSpPr>
-          <p:cNvPr id="4" name="Content Placeholder 3">
-            <a:extLst>
-              <a:ext uri="{FF2B5EF4-FFF2-40B4-BE49-F238E27FC236}">
-                <a16:creationId xmlns:a16="http://schemas.microsoft.com/office/drawing/2014/main" id="{89B801EE-E226-8C09-C68E-6501AFB00BB9}"/>
-              </a:ext>
-            </a:extLst>
-          </p:cNvPr>
+            <a:endParaRPr lang="en-US" dirty="0"/>
+          </a:p>
+        </p:txBody>
+      </p:sp>
+      <p:sp>
+        <p:nvSpPr>
+          <p:cNvPr id="4" name="Content Placeholder 3"/>
           <p:cNvSpPr>
             <a:spLocks noGrp="1"/>
           </p:cNvSpPr>
@@ -1784,8 +1623,8 @@
         </p:nvSpPr>
         <p:spPr>
           <a:xfrm>
-            <a:off x="6172200" y="1825625"/>
-            <a:ext cx="5181600" cy="4351338"/>
+            <a:off x="5467380" y="1533187"/>
+            <a:ext cx="4589899" cy="3654318"/>
           </a:xfrm>
         </p:spPr>
         <p:txBody>
@@ -1825,19 +1664,13 @@
               <a:rPr lang="en-US"/>
               <a:t>Fifth level</a:t>
             </a:r>
-            <a:endParaRPr lang="en-CA"/>
-          </a:p>
-        </p:txBody>
-      </p:sp>
-      <p:sp>
-        <p:nvSpPr>
-          <p:cNvPr id="5" name="Date Placeholder 4">
-            <a:extLst>
-              <a:ext uri="{FF2B5EF4-FFF2-40B4-BE49-F238E27FC236}">
-                <a16:creationId xmlns:a16="http://schemas.microsoft.com/office/drawing/2014/main" id="{30ECC5CC-7FAA-5736-6522-99E14349199F}"/>
-              </a:ext>
-            </a:extLst>
-          </p:cNvPr>
+            <a:endParaRPr lang="en-US" dirty="0"/>
+          </a:p>
+        </p:txBody>
+      </p:sp>
+      <p:sp>
+        <p:nvSpPr>
+          <p:cNvPr id="5" name="Date Placeholder 4"/>
           <p:cNvSpPr>
             <a:spLocks noGrp="1"/>
           </p:cNvSpPr>
@@ -1852,7 +1685,7 @@
           <a:p>
             <a:fld id="{5899F6B3-811F-4FB0-8A8F-1ECB6174A6D5}" type="datetimeFigureOut">
               <a:rPr lang="en-CA" smtClean="0"/>
-              <a:t>2025-07-24</a:t>
+              <a:t>2025-08-22</a:t>
             </a:fld>
             <a:endParaRPr lang="en-CA"/>
           </a:p>
@@ -1860,13 +1693,7 @@
       </p:sp>
       <p:sp>
         <p:nvSpPr>
-          <p:cNvPr id="6" name="Footer Placeholder 5">
-            <a:extLst>
-              <a:ext uri="{FF2B5EF4-FFF2-40B4-BE49-F238E27FC236}">
-                <a16:creationId xmlns:a16="http://schemas.microsoft.com/office/drawing/2014/main" id="{91B0AF57-52D9-6E7A-8285-9B0752412053}"/>
-              </a:ext>
-            </a:extLst>
-          </p:cNvPr>
+          <p:cNvPr id="6" name="Footer Placeholder 5"/>
           <p:cNvSpPr>
             <a:spLocks noGrp="1"/>
           </p:cNvSpPr>
@@ -1885,13 +1712,7 @@
       </p:sp>
       <p:sp>
         <p:nvSpPr>
-          <p:cNvPr id="7" name="Slide Number Placeholder 6">
-            <a:extLst>
-              <a:ext uri="{FF2B5EF4-FFF2-40B4-BE49-F238E27FC236}">
-                <a16:creationId xmlns:a16="http://schemas.microsoft.com/office/drawing/2014/main" id="{01DF1ED5-3AE2-9F5A-43D4-ADE62F40A7BA}"/>
-              </a:ext>
-            </a:extLst>
-          </p:cNvPr>
+          <p:cNvPr id="7" name="Slide Number Placeholder 6"/>
           <p:cNvSpPr>
             <a:spLocks noGrp="1"/>
           </p:cNvSpPr>
@@ -1915,7 +1736,7 @@
     </p:spTree>
     <p:extLst>
       <p:ext uri="{BB962C8B-B14F-4D97-AF65-F5344CB8AC3E}">
-        <p14:creationId xmlns:p14="http://schemas.microsoft.com/office/powerpoint/2010/main" val="1769726539"/>
+        <p14:creationId xmlns:p14="http://schemas.microsoft.com/office/powerpoint/2010/main" val="4005337047"/>
       </p:ext>
     </p:extLst>
   </p:cSld>
@@ -1944,13 +1765,7 @@
       </p:grpSpPr>
       <p:sp>
         <p:nvSpPr>
-          <p:cNvPr id="2" name="Title 1">
-            <a:extLst>
-              <a:ext uri="{FF2B5EF4-FFF2-40B4-BE49-F238E27FC236}">
-                <a16:creationId xmlns:a16="http://schemas.microsoft.com/office/drawing/2014/main" id="{615E21DA-C818-FDBA-48C5-7400223EC4C6}"/>
-              </a:ext>
-            </a:extLst>
-          </p:cNvPr>
+          <p:cNvPr id="2" name="Title 1"/>
           <p:cNvSpPr>
             <a:spLocks noGrp="1"/>
           </p:cNvSpPr>
@@ -1960,8 +1775,8 @@
         </p:nvSpPr>
         <p:spPr>
           <a:xfrm>
-            <a:off x="839788" y="365125"/>
-            <a:ext cx="10515600" cy="1325563"/>
+            <a:off x="743890" y="306638"/>
+            <a:ext cx="9314796" cy="1113227"/>
           </a:xfrm>
         </p:spPr>
         <p:txBody>
@@ -1972,19 +1787,13 @@
               <a:rPr lang="en-US"/>
               <a:t>Click to edit Master title style</a:t>
             </a:r>
-            <a:endParaRPr lang="en-CA"/>
-          </a:p>
-        </p:txBody>
-      </p:sp>
-      <p:sp>
-        <p:nvSpPr>
-          <p:cNvPr id="3" name="Text Placeholder 2">
-            <a:extLst>
-              <a:ext uri="{FF2B5EF4-FFF2-40B4-BE49-F238E27FC236}">
-                <a16:creationId xmlns:a16="http://schemas.microsoft.com/office/drawing/2014/main" id="{1EA3788D-4383-6F88-87E6-F65988D7CB39}"/>
-              </a:ext>
-            </a:extLst>
-          </p:cNvPr>
+            <a:endParaRPr lang="en-US" dirty="0"/>
+          </a:p>
+        </p:txBody>
+      </p:sp>
+      <p:sp>
+        <p:nvSpPr>
+          <p:cNvPr id="3" name="Text Placeholder 2"/>
           <p:cNvSpPr>
             <a:spLocks noGrp="1"/>
           </p:cNvSpPr>
@@ -1994,8 +1803,8 @@
         </p:nvSpPr>
         <p:spPr>
           <a:xfrm>
-            <a:off x="839788" y="1681163"/>
-            <a:ext cx="5157787" cy="823912"/>
+            <a:off x="743891" y="1411865"/>
+            <a:ext cx="4568806" cy="691934"/>
           </a:xfrm>
         </p:spPr>
         <p:txBody>
@@ -2003,39 +1812,39 @@
           <a:lstStyle>
             <a:lvl1pPr marL="0" indent="0">
               <a:buNone/>
-              <a:defRPr sz="2400" b="1"/>
+              <a:defRPr sz="2016" b="1"/>
             </a:lvl1pPr>
-            <a:lvl2pPr marL="457200" indent="0">
-              <a:buNone/>
-              <a:defRPr sz="2000" b="1"/>
+            <a:lvl2pPr marL="383957" indent="0">
+              <a:buNone/>
+              <a:defRPr sz="1680" b="1"/>
             </a:lvl2pPr>
-            <a:lvl3pPr marL="914400" indent="0">
-              <a:buNone/>
-              <a:defRPr sz="1800" b="1"/>
+            <a:lvl3pPr marL="767913" indent="0">
+              <a:buNone/>
+              <a:defRPr sz="1512" b="1"/>
             </a:lvl3pPr>
-            <a:lvl4pPr marL="1371600" indent="0">
-              <a:buNone/>
-              <a:defRPr sz="1600" b="1"/>
+            <a:lvl4pPr marL="1151870" indent="0">
+              <a:buNone/>
+              <a:defRPr sz="1344" b="1"/>
             </a:lvl4pPr>
-            <a:lvl5pPr marL="1828800" indent="0">
-              <a:buNone/>
-              <a:defRPr sz="1600" b="1"/>
+            <a:lvl5pPr marL="1535826" indent="0">
+              <a:buNone/>
+              <a:defRPr sz="1344" b="1"/>
             </a:lvl5pPr>
-            <a:lvl6pPr marL="2286000" indent="0">
-              <a:buNone/>
-              <a:defRPr sz="1600" b="1"/>
+            <a:lvl6pPr marL="1919783" indent="0">
+              <a:buNone/>
+              <a:defRPr sz="1344" b="1"/>
             </a:lvl6pPr>
-            <a:lvl7pPr marL="2743200" indent="0">
-              <a:buNone/>
-              <a:defRPr sz="1600" b="1"/>
+            <a:lvl7pPr marL="2303739" indent="0">
+              <a:buNone/>
+              <a:defRPr sz="1344" b="1"/>
             </a:lvl7pPr>
-            <a:lvl8pPr marL="3200400" indent="0">
-              <a:buNone/>
-              <a:defRPr sz="1600" b="1"/>
+            <a:lvl8pPr marL="2687696" indent="0">
+              <a:buNone/>
+              <a:defRPr sz="1344" b="1"/>
             </a:lvl8pPr>
-            <a:lvl9pPr marL="3657600" indent="0">
-              <a:buNone/>
-              <a:defRPr sz="1600" b="1"/>
+            <a:lvl9pPr marL="3071652" indent="0">
+              <a:buNone/>
+              <a:defRPr sz="1344" b="1"/>
             </a:lvl9pPr>
           </a:lstStyle>
           <a:p>
@@ -2049,13 +1858,7 @@
       </p:sp>
       <p:sp>
         <p:nvSpPr>
-          <p:cNvPr id="4" name="Content Placeholder 3">
-            <a:extLst>
-              <a:ext uri="{FF2B5EF4-FFF2-40B4-BE49-F238E27FC236}">
-                <a16:creationId xmlns:a16="http://schemas.microsoft.com/office/drawing/2014/main" id="{D2185533-F86E-5FD2-7B8A-6BED1ED16394}"/>
-              </a:ext>
-            </a:extLst>
-          </p:cNvPr>
+          <p:cNvPr id="4" name="Content Placeholder 3"/>
           <p:cNvSpPr>
             <a:spLocks noGrp="1"/>
           </p:cNvSpPr>
@@ -2065,8 +1868,8 @@
         </p:nvSpPr>
         <p:spPr>
           <a:xfrm>
-            <a:off x="839788" y="2505075"/>
-            <a:ext cx="5157787" cy="3684588"/>
+            <a:off x="743891" y="2103799"/>
+            <a:ext cx="4568806" cy="3094372"/>
           </a:xfrm>
         </p:spPr>
         <p:txBody>
@@ -2106,19 +1909,13 @@
               <a:rPr lang="en-US"/>
               <a:t>Fifth level</a:t>
             </a:r>
-            <a:endParaRPr lang="en-CA"/>
-          </a:p>
-        </p:txBody>
-      </p:sp>
-      <p:sp>
-        <p:nvSpPr>
-          <p:cNvPr id="5" name="Text Placeholder 4">
-            <a:extLst>
-              <a:ext uri="{FF2B5EF4-FFF2-40B4-BE49-F238E27FC236}">
-                <a16:creationId xmlns:a16="http://schemas.microsoft.com/office/drawing/2014/main" id="{CA3D3EB9-64C6-FA79-B5CE-D8AF5F6901B3}"/>
-              </a:ext>
-            </a:extLst>
-          </p:cNvPr>
+            <a:endParaRPr lang="en-US" dirty="0"/>
+          </a:p>
+        </p:txBody>
+      </p:sp>
+      <p:sp>
+        <p:nvSpPr>
+          <p:cNvPr id="5" name="Text Placeholder 4"/>
           <p:cNvSpPr>
             <a:spLocks noGrp="1"/>
           </p:cNvSpPr>
@@ -2128,8 +1925,8 @@
         </p:nvSpPr>
         <p:spPr>
           <a:xfrm>
-            <a:off x="6172200" y="1681163"/>
-            <a:ext cx="5183188" cy="823912"/>
+            <a:off x="5467380" y="1411865"/>
+            <a:ext cx="4591306" cy="691934"/>
           </a:xfrm>
         </p:spPr>
         <p:txBody>
@@ -2137,39 +1934,39 @@
           <a:lstStyle>
             <a:lvl1pPr marL="0" indent="0">
               <a:buNone/>
-              <a:defRPr sz="2400" b="1"/>
+              <a:defRPr sz="2016" b="1"/>
             </a:lvl1pPr>
-            <a:lvl2pPr marL="457200" indent="0">
-              <a:buNone/>
-              <a:defRPr sz="2000" b="1"/>
+            <a:lvl2pPr marL="383957" indent="0">
+              <a:buNone/>
+              <a:defRPr sz="1680" b="1"/>
             </a:lvl2pPr>
-            <a:lvl3pPr marL="914400" indent="0">
-              <a:buNone/>
-              <a:defRPr sz="1800" b="1"/>
+            <a:lvl3pPr marL="767913" indent="0">
+              <a:buNone/>
+              <a:defRPr sz="1512" b="1"/>
             </a:lvl3pPr>
-            <a:lvl4pPr marL="1371600" indent="0">
-              <a:buNone/>
-              <a:defRPr sz="1600" b="1"/>
+            <a:lvl4pPr marL="1151870" indent="0">
+              <a:buNone/>
+              <a:defRPr sz="1344" b="1"/>
             </a:lvl4pPr>
-            <a:lvl5pPr marL="1828800" indent="0">
-              <a:buNone/>
-              <a:defRPr sz="1600" b="1"/>
+            <a:lvl5pPr marL="1535826" indent="0">
+              <a:buNone/>
+              <a:defRPr sz="1344" b="1"/>
             </a:lvl5pPr>
-            <a:lvl6pPr marL="2286000" indent="0">
-              <a:buNone/>
-              <a:defRPr sz="1600" b="1"/>
+            <a:lvl6pPr marL="1919783" indent="0">
+              <a:buNone/>
+              <a:defRPr sz="1344" b="1"/>
             </a:lvl6pPr>
-            <a:lvl7pPr marL="2743200" indent="0">
-              <a:buNone/>
-              <a:defRPr sz="1600" b="1"/>
+            <a:lvl7pPr marL="2303739" indent="0">
+              <a:buNone/>
+              <a:defRPr sz="1344" b="1"/>
             </a:lvl7pPr>
-            <a:lvl8pPr marL="3200400" indent="0">
-              <a:buNone/>
-              <a:defRPr sz="1600" b="1"/>
+            <a:lvl8pPr marL="2687696" indent="0">
+              <a:buNone/>
+              <a:defRPr sz="1344" b="1"/>
             </a:lvl8pPr>
-            <a:lvl9pPr marL="3657600" indent="0">
-              <a:buNone/>
-              <a:defRPr sz="1600" b="1"/>
+            <a:lvl9pPr marL="3071652" indent="0">
+              <a:buNone/>
+              <a:defRPr sz="1344" b="1"/>
             </a:lvl9pPr>
           </a:lstStyle>
           <a:p>
@@ -2183,13 +1980,7 @@
       </p:sp>
       <p:sp>
         <p:nvSpPr>
-          <p:cNvPr id="6" name="Content Placeholder 5">
-            <a:extLst>
-              <a:ext uri="{FF2B5EF4-FFF2-40B4-BE49-F238E27FC236}">
-                <a16:creationId xmlns:a16="http://schemas.microsoft.com/office/drawing/2014/main" id="{38EB4F67-0178-1C1A-AFF9-A62E8CF41CFF}"/>
-              </a:ext>
-            </a:extLst>
-          </p:cNvPr>
+          <p:cNvPr id="6" name="Content Placeholder 5"/>
           <p:cNvSpPr>
             <a:spLocks noGrp="1"/>
           </p:cNvSpPr>
@@ -2199,8 +1990,8 @@
         </p:nvSpPr>
         <p:spPr>
           <a:xfrm>
-            <a:off x="6172200" y="2505075"/>
-            <a:ext cx="5183188" cy="3684588"/>
+            <a:off x="5467380" y="2103799"/>
+            <a:ext cx="4591306" cy="3094372"/>
           </a:xfrm>
         </p:spPr>
         <p:txBody>
@@ -2240,19 +2031,13 @@
               <a:rPr lang="en-US"/>
               <a:t>Fifth level</a:t>
             </a:r>
-            <a:endParaRPr lang="en-CA"/>
-          </a:p>
-        </p:txBody>
-      </p:sp>
-      <p:sp>
-        <p:nvSpPr>
-          <p:cNvPr id="7" name="Date Placeholder 6">
-            <a:extLst>
-              <a:ext uri="{FF2B5EF4-FFF2-40B4-BE49-F238E27FC236}">
-                <a16:creationId xmlns:a16="http://schemas.microsoft.com/office/drawing/2014/main" id="{3D1EA1F0-5CE8-EFDF-6C32-A2FE2FCA3945}"/>
-              </a:ext>
-            </a:extLst>
-          </p:cNvPr>
+            <a:endParaRPr lang="en-US" dirty="0"/>
+          </a:p>
+        </p:txBody>
+      </p:sp>
+      <p:sp>
+        <p:nvSpPr>
+          <p:cNvPr id="7" name="Date Placeholder 6"/>
           <p:cNvSpPr>
             <a:spLocks noGrp="1"/>
           </p:cNvSpPr>
@@ -2267,7 +2052,7 @@
           <a:p>
             <a:fld id="{5899F6B3-811F-4FB0-8A8F-1ECB6174A6D5}" type="datetimeFigureOut">
               <a:rPr lang="en-CA" smtClean="0"/>
-              <a:t>2025-07-24</a:t>
+              <a:t>2025-08-22</a:t>
             </a:fld>
             <a:endParaRPr lang="en-CA"/>
           </a:p>
@@ -2275,13 +2060,7 @@
       </p:sp>
       <p:sp>
         <p:nvSpPr>
-          <p:cNvPr id="8" name="Footer Placeholder 7">
-            <a:extLst>
-              <a:ext uri="{FF2B5EF4-FFF2-40B4-BE49-F238E27FC236}">
-                <a16:creationId xmlns:a16="http://schemas.microsoft.com/office/drawing/2014/main" id="{9F29ED5C-D1BE-6F13-F04B-A3686217DF01}"/>
-              </a:ext>
-            </a:extLst>
-          </p:cNvPr>
+          <p:cNvPr id="8" name="Footer Placeholder 7"/>
           <p:cNvSpPr>
             <a:spLocks noGrp="1"/>
           </p:cNvSpPr>
@@ -2300,13 +2079,7 @@
       </p:sp>
       <p:sp>
         <p:nvSpPr>
-          <p:cNvPr id="9" name="Slide Number Placeholder 8">
-            <a:extLst>
-              <a:ext uri="{FF2B5EF4-FFF2-40B4-BE49-F238E27FC236}">
-                <a16:creationId xmlns:a16="http://schemas.microsoft.com/office/drawing/2014/main" id="{AB3CB9CE-061A-0B62-12E9-B620CF9AFB90}"/>
-              </a:ext>
-            </a:extLst>
-          </p:cNvPr>
+          <p:cNvPr id="9" name="Slide Number Placeholder 8"/>
           <p:cNvSpPr>
             <a:spLocks noGrp="1"/>
           </p:cNvSpPr>
@@ -2330,7 +2103,7 @@
     </p:spTree>
     <p:extLst>
       <p:ext uri="{BB962C8B-B14F-4D97-AF65-F5344CB8AC3E}">
-        <p14:creationId xmlns:p14="http://schemas.microsoft.com/office/powerpoint/2010/main" val="2712856587"/>
+        <p14:creationId xmlns:p14="http://schemas.microsoft.com/office/powerpoint/2010/main" val="2013822144"/>
       </p:ext>
     </p:extLst>
   </p:cSld>
@@ -2359,13 +2132,7 @@
       </p:grpSpPr>
       <p:sp>
         <p:nvSpPr>
-          <p:cNvPr id="2" name="Title 1">
-            <a:extLst>
-              <a:ext uri="{FF2B5EF4-FFF2-40B4-BE49-F238E27FC236}">
-                <a16:creationId xmlns:a16="http://schemas.microsoft.com/office/drawing/2014/main" id="{744236D6-9F6E-62DE-F049-F52D50C3D475}"/>
-              </a:ext>
-            </a:extLst>
-          </p:cNvPr>
+          <p:cNvPr id="2" name="Title 1"/>
           <p:cNvSpPr>
             <a:spLocks noGrp="1"/>
           </p:cNvSpPr>
@@ -2382,19 +2149,13 @@
               <a:rPr lang="en-US"/>
               <a:t>Click to edit Master title style</a:t>
             </a:r>
-            <a:endParaRPr lang="en-CA"/>
-          </a:p>
-        </p:txBody>
-      </p:sp>
-      <p:sp>
-        <p:nvSpPr>
-          <p:cNvPr id="3" name="Date Placeholder 2">
-            <a:extLst>
-              <a:ext uri="{FF2B5EF4-FFF2-40B4-BE49-F238E27FC236}">
-                <a16:creationId xmlns:a16="http://schemas.microsoft.com/office/drawing/2014/main" id="{843485A1-D02F-A7C6-1854-270D766A245A}"/>
-              </a:ext>
-            </a:extLst>
-          </p:cNvPr>
+            <a:endParaRPr lang="en-US" dirty="0"/>
+          </a:p>
+        </p:txBody>
+      </p:sp>
+      <p:sp>
+        <p:nvSpPr>
+          <p:cNvPr id="3" name="Date Placeholder 2"/>
           <p:cNvSpPr>
             <a:spLocks noGrp="1"/>
           </p:cNvSpPr>
@@ -2409,7 +2170,7 @@
           <a:p>
             <a:fld id="{5899F6B3-811F-4FB0-8A8F-1ECB6174A6D5}" type="datetimeFigureOut">
               <a:rPr lang="en-CA" smtClean="0"/>
-              <a:t>2025-07-24</a:t>
+              <a:t>2025-08-22</a:t>
             </a:fld>
             <a:endParaRPr lang="en-CA"/>
           </a:p>
@@ -2417,13 +2178,7 @@
       </p:sp>
       <p:sp>
         <p:nvSpPr>
-          <p:cNvPr id="4" name="Footer Placeholder 3">
-            <a:extLst>
-              <a:ext uri="{FF2B5EF4-FFF2-40B4-BE49-F238E27FC236}">
-                <a16:creationId xmlns:a16="http://schemas.microsoft.com/office/drawing/2014/main" id="{6E51F595-4FED-3A5B-7BA7-642E0E497B5A}"/>
-              </a:ext>
-            </a:extLst>
-          </p:cNvPr>
+          <p:cNvPr id="4" name="Footer Placeholder 3"/>
           <p:cNvSpPr>
             <a:spLocks noGrp="1"/>
           </p:cNvSpPr>
@@ -2442,13 +2197,7 @@
       </p:sp>
       <p:sp>
         <p:nvSpPr>
-          <p:cNvPr id="5" name="Slide Number Placeholder 4">
-            <a:extLst>
-              <a:ext uri="{FF2B5EF4-FFF2-40B4-BE49-F238E27FC236}">
-                <a16:creationId xmlns:a16="http://schemas.microsoft.com/office/drawing/2014/main" id="{C309474B-9ED3-EE27-BF78-108C8CEF0358}"/>
-              </a:ext>
-            </a:extLst>
-          </p:cNvPr>
+          <p:cNvPr id="5" name="Slide Number Placeholder 4"/>
           <p:cNvSpPr>
             <a:spLocks noGrp="1"/>
           </p:cNvSpPr>
@@ -2472,7 +2221,7 @@
     </p:spTree>
     <p:extLst>
       <p:ext uri="{BB962C8B-B14F-4D97-AF65-F5344CB8AC3E}">
-        <p14:creationId xmlns:p14="http://schemas.microsoft.com/office/powerpoint/2010/main" val="567824806"/>
+        <p14:creationId xmlns:p14="http://schemas.microsoft.com/office/powerpoint/2010/main" val="277073789"/>
       </p:ext>
     </p:extLst>
   </p:cSld>
@@ -2501,13 +2250,7 @@
       </p:grpSpPr>
       <p:sp>
         <p:nvSpPr>
-          <p:cNvPr id="2" name="Date Placeholder 1">
-            <a:extLst>
-              <a:ext uri="{FF2B5EF4-FFF2-40B4-BE49-F238E27FC236}">
-                <a16:creationId xmlns:a16="http://schemas.microsoft.com/office/drawing/2014/main" id="{CADE7598-6D0B-EAF6-F172-755D72E4C4EA}"/>
-              </a:ext>
-            </a:extLst>
-          </p:cNvPr>
+          <p:cNvPr id="2" name="Date Placeholder 1"/>
           <p:cNvSpPr>
             <a:spLocks noGrp="1"/>
           </p:cNvSpPr>
@@ -2522,7 +2265,7 @@
           <a:p>
             <a:fld id="{5899F6B3-811F-4FB0-8A8F-1ECB6174A6D5}" type="datetimeFigureOut">
               <a:rPr lang="en-CA" smtClean="0"/>
-              <a:t>2025-07-24</a:t>
+              <a:t>2025-08-22</a:t>
             </a:fld>
             <a:endParaRPr lang="en-CA"/>
           </a:p>
@@ -2530,13 +2273,7 @@
       </p:sp>
       <p:sp>
         <p:nvSpPr>
-          <p:cNvPr id="3" name="Footer Placeholder 2">
-            <a:extLst>
-              <a:ext uri="{FF2B5EF4-FFF2-40B4-BE49-F238E27FC236}">
-                <a16:creationId xmlns:a16="http://schemas.microsoft.com/office/drawing/2014/main" id="{10DAB7D7-039B-778A-C821-C5383E33904E}"/>
-              </a:ext>
-            </a:extLst>
-          </p:cNvPr>
+          <p:cNvPr id="3" name="Footer Placeholder 2"/>
           <p:cNvSpPr>
             <a:spLocks noGrp="1"/>
           </p:cNvSpPr>
@@ -2555,13 +2292,7 @@
       </p:sp>
       <p:sp>
         <p:nvSpPr>
-          <p:cNvPr id="4" name="Slide Number Placeholder 3">
-            <a:extLst>
-              <a:ext uri="{FF2B5EF4-FFF2-40B4-BE49-F238E27FC236}">
-                <a16:creationId xmlns:a16="http://schemas.microsoft.com/office/drawing/2014/main" id="{11213B24-109C-C375-3E80-A267CC4EC109}"/>
-              </a:ext>
-            </a:extLst>
-          </p:cNvPr>
+          <p:cNvPr id="4" name="Slide Number Placeholder 3"/>
           <p:cNvSpPr>
             <a:spLocks noGrp="1"/>
           </p:cNvSpPr>
@@ -2585,7 +2316,7 @@
     </p:spTree>
     <p:extLst>
       <p:ext uri="{BB962C8B-B14F-4D97-AF65-F5344CB8AC3E}">
-        <p14:creationId xmlns:p14="http://schemas.microsoft.com/office/powerpoint/2010/main" val="1641438391"/>
+        <p14:creationId xmlns:p14="http://schemas.microsoft.com/office/powerpoint/2010/main" val="3380587948"/>
       </p:ext>
     </p:extLst>
   </p:cSld>
@@ -2614,13 +2345,7 @@
       </p:grpSpPr>
       <p:sp>
         <p:nvSpPr>
-          <p:cNvPr id="2" name="Title 1">
-            <a:extLst>
-              <a:ext uri="{FF2B5EF4-FFF2-40B4-BE49-F238E27FC236}">
-                <a16:creationId xmlns:a16="http://schemas.microsoft.com/office/drawing/2014/main" id="{C8A36997-3ED5-3842-25DC-62837C70E6FE}"/>
-              </a:ext>
-            </a:extLst>
-          </p:cNvPr>
+          <p:cNvPr id="2" name="Title 1"/>
           <p:cNvSpPr>
             <a:spLocks noGrp="1"/>
           </p:cNvSpPr>
@@ -2630,15 +2355,15 @@
         </p:nvSpPr>
         <p:spPr>
           <a:xfrm>
-            <a:off x="839788" y="457200"/>
-            <a:ext cx="3932237" cy="1600200"/>
+            <a:off x="743891" y="383963"/>
+            <a:ext cx="3483204" cy="1343872"/>
           </a:xfrm>
         </p:spPr>
         <p:txBody>
           <a:bodyPr anchor="b"/>
           <a:lstStyle>
             <a:lvl1pPr>
-              <a:defRPr sz="3200"/>
+              <a:defRPr sz="2687"/>
             </a:lvl1pPr>
           </a:lstStyle>
           <a:p>
@@ -2646,19 +2371,13 @@
               <a:rPr lang="en-US"/>
               <a:t>Click to edit Master title style</a:t>
             </a:r>
-            <a:endParaRPr lang="en-CA"/>
-          </a:p>
-        </p:txBody>
-      </p:sp>
-      <p:sp>
-        <p:nvSpPr>
-          <p:cNvPr id="3" name="Content Placeholder 2">
-            <a:extLst>
-              <a:ext uri="{FF2B5EF4-FFF2-40B4-BE49-F238E27FC236}">
-                <a16:creationId xmlns:a16="http://schemas.microsoft.com/office/drawing/2014/main" id="{F02373CA-7E90-9CBA-0260-2B0984F42A1E}"/>
-              </a:ext>
-            </a:extLst>
-          </p:cNvPr>
+            <a:endParaRPr lang="en-US" dirty="0"/>
+          </a:p>
+        </p:txBody>
+      </p:sp>
+      <p:sp>
+        <p:nvSpPr>
+          <p:cNvPr id="3" name="Content Placeholder 2"/>
           <p:cNvSpPr>
             <a:spLocks noGrp="1"/>
           </p:cNvSpPr>
@@ -2668,39 +2387,39 @@
         </p:nvSpPr>
         <p:spPr>
           <a:xfrm>
-            <a:off x="5183188" y="987425"/>
-            <a:ext cx="6172200" cy="4873625"/>
+            <a:off x="4591306" y="829255"/>
+            <a:ext cx="5467380" cy="4092942"/>
           </a:xfrm>
         </p:spPr>
         <p:txBody>
           <a:bodyPr/>
           <a:lstStyle>
             <a:lvl1pPr>
-              <a:defRPr sz="3200"/>
+              <a:defRPr sz="2687"/>
             </a:lvl1pPr>
             <a:lvl2pPr>
-              <a:defRPr sz="2800"/>
+              <a:defRPr sz="2351"/>
             </a:lvl2pPr>
             <a:lvl3pPr>
-              <a:defRPr sz="2400"/>
+              <a:defRPr sz="2016"/>
             </a:lvl3pPr>
             <a:lvl4pPr>
-              <a:defRPr sz="2000"/>
+              <a:defRPr sz="1680"/>
             </a:lvl4pPr>
             <a:lvl5pPr>
-              <a:defRPr sz="2000"/>
+              <a:defRPr sz="1680"/>
             </a:lvl5pPr>
             <a:lvl6pPr>
-              <a:defRPr sz="2000"/>
+              <a:defRPr sz="1680"/>
             </a:lvl6pPr>
             <a:lvl7pPr>
-              <a:defRPr sz="2000"/>
+              <a:defRPr sz="1680"/>
             </a:lvl7pPr>
             <a:lvl8pPr>
-              <a:defRPr sz="2000"/>
+              <a:defRPr sz="1680"/>
             </a:lvl8pPr>
             <a:lvl9pPr>
-              <a:defRPr sz="2000"/>
+              <a:defRPr sz="1680"/>
             </a:lvl9pPr>
           </a:lstStyle>
           <a:p>
@@ -2737,19 +2456,13 @@
               <a:rPr lang="en-US"/>
               <a:t>Fifth level</a:t>
             </a:r>
-            <a:endParaRPr lang="en-CA"/>
-          </a:p>
-        </p:txBody>
-      </p:sp>
-      <p:sp>
-        <p:nvSpPr>
-          <p:cNvPr id="4" name="Text Placeholder 3">
-            <a:extLst>
-              <a:ext uri="{FF2B5EF4-FFF2-40B4-BE49-F238E27FC236}">
-                <a16:creationId xmlns:a16="http://schemas.microsoft.com/office/drawing/2014/main" id="{64387833-CF3D-27CA-95E6-A7E60C3B0F51}"/>
-              </a:ext>
-            </a:extLst>
-          </p:cNvPr>
+            <a:endParaRPr lang="en-US" dirty="0"/>
+          </a:p>
+        </p:txBody>
+      </p:sp>
+      <p:sp>
+        <p:nvSpPr>
+          <p:cNvPr id="4" name="Text Placeholder 3"/>
           <p:cNvSpPr>
             <a:spLocks noGrp="1"/>
           </p:cNvSpPr>
@@ -2759,8 +2472,8 @@
         </p:nvSpPr>
         <p:spPr>
           <a:xfrm>
-            <a:off x="839788" y="2057400"/>
-            <a:ext cx="3932237" cy="3811588"/>
+            <a:off x="743891" y="1727835"/>
+            <a:ext cx="3483204" cy="3201028"/>
           </a:xfrm>
         </p:spPr>
         <p:txBody>
@@ -2768,39 +2481,39 @@
           <a:lstStyle>
             <a:lvl1pPr marL="0" indent="0">
               <a:buNone/>
-              <a:defRPr sz="1600"/>
+              <a:defRPr sz="1344"/>
             </a:lvl1pPr>
-            <a:lvl2pPr marL="457200" indent="0">
-              <a:buNone/>
-              <a:defRPr sz="1400"/>
+            <a:lvl2pPr marL="383957" indent="0">
+              <a:buNone/>
+              <a:defRPr sz="1176"/>
             </a:lvl2pPr>
-            <a:lvl3pPr marL="914400" indent="0">
-              <a:buNone/>
-              <a:defRPr sz="1200"/>
+            <a:lvl3pPr marL="767913" indent="0">
+              <a:buNone/>
+              <a:defRPr sz="1008"/>
             </a:lvl3pPr>
-            <a:lvl4pPr marL="1371600" indent="0">
-              <a:buNone/>
-              <a:defRPr sz="1000"/>
+            <a:lvl4pPr marL="1151870" indent="0">
+              <a:buNone/>
+              <a:defRPr sz="840"/>
             </a:lvl4pPr>
-            <a:lvl5pPr marL="1828800" indent="0">
-              <a:buNone/>
-              <a:defRPr sz="1000"/>
+            <a:lvl5pPr marL="1535826" indent="0">
+              <a:buNone/>
+              <a:defRPr sz="840"/>
             </a:lvl5pPr>
-            <a:lvl6pPr marL="2286000" indent="0">
-              <a:buNone/>
-              <a:defRPr sz="1000"/>
+            <a:lvl6pPr marL="1919783" indent="0">
+              <a:buNone/>
+              <a:defRPr sz="840"/>
             </a:lvl6pPr>
-            <a:lvl7pPr marL="2743200" indent="0">
-              <a:buNone/>
-              <a:defRPr sz="1000"/>
+            <a:lvl7pPr marL="2303739" indent="0">
+              <a:buNone/>
+              <a:defRPr sz="840"/>
             </a:lvl7pPr>
-            <a:lvl8pPr marL="3200400" indent="0">
-              <a:buNone/>
-              <a:defRPr sz="1000"/>
+            <a:lvl8pPr marL="2687696" indent="0">
+              <a:buNone/>
+              <a:defRPr sz="840"/>
             </a:lvl8pPr>
-            <a:lvl9pPr marL="3657600" indent="0">
-              <a:buNone/>
-              <a:defRPr sz="1000"/>
+            <a:lvl9pPr marL="3071652" indent="0">
+              <a:buNone/>
+              <a:defRPr sz="840"/>
             </a:lvl9pPr>
           </a:lstStyle>
           <a:p>
@@ -2814,13 +2527,7 @@
       </p:sp>
       <p:sp>
         <p:nvSpPr>
-          <p:cNvPr id="5" name="Date Placeholder 4">
-            <a:extLst>
-              <a:ext uri="{FF2B5EF4-FFF2-40B4-BE49-F238E27FC236}">
-                <a16:creationId xmlns:a16="http://schemas.microsoft.com/office/drawing/2014/main" id="{99B55C6A-0412-9C24-480E-E1E93453F33D}"/>
-              </a:ext>
-            </a:extLst>
-          </p:cNvPr>
+          <p:cNvPr id="5" name="Date Placeholder 4"/>
           <p:cNvSpPr>
             <a:spLocks noGrp="1"/>
           </p:cNvSpPr>
@@ -2835,7 +2542,7 @@
           <a:p>
             <a:fld id="{5899F6B3-811F-4FB0-8A8F-1ECB6174A6D5}" type="datetimeFigureOut">
               <a:rPr lang="en-CA" smtClean="0"/>
-              <a:t>2025-07-24</a:t>
+              <a:t>2025-08-22</a:t>
             </a:fld>
             <a:endParaRPr lang="en-CA"/>
           </a:p>
@@ -2843,13 +2550,7 @@
       </p:sp>
       <p:sp>
         <p:nvSpPr>
-          <p:cNvPr id="6" name="Footer Placeholder 5">
-            <a:extLst>
-              <a:ext uri="{FF2B5EF4-FFF2-40B4-BE49-F238E27FC236}">
-                <a16:creationId xmlns:a16="http://schemas.microsoft.com/office/drawing/2014/main" id="{5F0855EF-D1BD-EBD4-C3C0-5E5D5928C7EF}"/>
-              </a:ext>
-            </a:extLst>
-          </p:cNvPr>
+          <p:cNvPr id="6" name="Footer Placeholder 5"/>
           <p:cNvSpPr>
             <a:spLocks noGrp="1"/>
           </p:cNvSpPr>
@@ -2868,13 +2569,7 @@
       </p:sp>
       <p:sp>
         <p:nvSpPr>
-          <p:cNvPr id="7" name="Slide Number Placeholder 6">
-            <a:extLst>
-              <a:ext uri="{FF2B5EF4-FFF2-40B4-BE49-F238E27FC236}">
-                <a16:creationId xmlns:a16="http://schemas.microsoft.com/office/drawing/2014/main" id="{16E51FBD-1637-EA27-F5BE-0EC25A5D0DB6}"/>
-              </a:ext>
-            </a:extLst>
-          </p:cNvPr>
+          <p:cNvPr id="7" name="Slide Number Placeholder 6"/>
           <p:cNvSpPr>
             <a:spLocks noGrp="1"/>
           </p:cNvSpPr>
@@ -2898,7 +2593,7 @@
     </p:spTree>
     <p:extLst>
       <p:ext uri="{BB962C8B-B14F-4D97-AF65-F5344CB8AC3E}">
-        <p14:creationId xmlns:p14="http://schemas.microsoft.com/office/powerpoint/2010/main" val="2898695589"/>
+        <p14:creationId xmlns:p14="http://schemas.microsoft.com/office/powerpoint/2010/main" val="1159438320"/>
       </p:ext>
     </p:extLst>
   </p:cSld>
@@ -2927,13 +2622,7 @@
       </p:grpSpPr>
       <p:sp>
         <p:nvSpPr>
-          <p:cNvPr id="2" name="Title 1">
-            <a:extLst>
-              <a:ext uri="{FF2B5EF4-FFF2-40B4-BE49-F238E27FC236}">
-                <a16:creationId xmlns:a16="http://schemas.microsoft.com/office/drawing/2014/main" id="{BF20F7AD-D767-86FC-5581-42438DD01DAC}"/>
-              </a:ext>
-            </a:extLst>
-          </p:cNvPr>
+          <p:cNvPr id="2" name="Title 1"/>
           <p:cNvSpPr>
             <a:spLocks noGrp="1"/>
           </p:cNvSpPr>
@@ -2943,15 +2632,15 @@
         </p:nvSpPr>
         <p:spPr>
           <a:xfrm>
-            <a:off x="839788" y="457200"/>
-            <a:ext cx="3932237" cy="1600200"/>
+            <a:off x="743891" y="383963"/>
+            <a:ext cx="3483204" cy="1343872"/>
           </a:xfrm>
         </p:spPr>
         <p:txBody>
           <a:bodyPr anchor="b"/>
           <a:lstStyle>
             <a:lvl1pPr>
-              <a:defRPr sz="3200"/>
+              <a:defRPr sz="2687"/>
             </a:lvl1pPr>
           </a:lstStyle>
           <a:p>
@@ -2959,21 +2648,15 @@
               <a:rPr lang="en-US"/>
               <a:t>Click to edit Master title style</a:t>
             </a:r>
-            <a:endParaRPr lang="en-CA"/>
-          </a:p>
-        </p:txBody>
-      </p:sp>
-      <p:sp>
-        <p:nvSpPr>
-          <p:cNvPr id="3" name="Picture Placeholder 2">
-            <a:extLst>
-              <a:ext uri="{FF2B5EF4-FFF2-40B4-BE49-F238E27FC236}">
-                <a16:creationId xmlns:a16="http://schemas.microsoft.com/office/drawing/2014/main" id="{C8483C0A-BDB4-C2B8-A0AE-D1F0BF8473B3}"/>
-              </a:ext>
-            </a:extLst>
-          </p:cNvPr>
-          <p:cNvSpPr>
-            <a:spLocks noGrp="1"/>
+            <a:endParaRPr lang="en-US" dirty="0"/>
+          </a:p>
+        </p:txBody>
+      </p:sp>
+      <p:sp>
+        <p:nvSpPr>
+          <p:cNvPr id="3" name="Picture Placeholder 2"/>
+          <p:cNvSpPr>
+            <a:spLocks noGrp="1" noChangeAspect="1"/>
           </p:cNvSpPr>
           <p:nvPr>
             <p:ph type="pic" idx="1"/>
@@ -2981,64 +2664,62 @@
         </p:nvSpPr>
         <p:spPr>
           <a:xfrm>
-            <a:off x="5183188" y="987425"/>
-            <a:ext cx="6172200" cy="4873625"/>
+            <a:off x="4591306" y="829255"/>
+            <a:ext cx="5467380" cy="4092942"/>
           </a:xfrm>
         </p:spPr>
         <p:txBody>
-          <a:bodyPr/>
+          <a:bodyPr anchor="t"/>
           <a:lstStyle>
             <a:lvl1pPr marL="0" indent="0">
               <a:buNone/>
-              <a:defRPr sz="3200"/>
+              <a:defRPr sz="2687"/>
             </a:lvl1pPr>
-            <a:lvl2pPr marL="457200" indent="0">
-              <a:buNone/>
-              <a:defRPr sz="2800"/>
+            <a:lvl2pPr marL="383957" indent="0">
+              <a:buNone/>
+              <a:defRPr sz="2351"/>
             </a:lvl2pPr>
-            <a:lvl3pPr marL="914400" indent="0">
-              <a:buNone/>
-              <a:defRPr sz="2400"/>
+            <a:lvl3pPr marL="767913" indent="0">
+              <a:buNone/>
+              <a:defRPr sz="2016"/>
             </a:lvl3pPr>
-            <a:lvl4pPr marL="1371600" indent="0">
-              <a:buNone/>
-              <a:defRPr sz="2000"/>
+            <a:lvl4pPr marL="1151870" indent="0">
+              <a:buNone/>
+              <a:defRPr sz="1680"/>
             </a:lvl4pPr>
-            <a:lvl5pPr marL="1828800" indent="0">
-              <a:buNone/>
-              <a:defRPr sz="2000"/>
+            <a:lvl5pPr marL="1535826" indent="0">
+              <a:buNone/>
+              <a:defRPr sz="1680"/>
             </a:lvl5pPr>
-            <a:lvl6pPr marL="2286000" indent="0">
-              <a:buNone/>
-              <a:defRPr sz="2000"/>
+            <a:lvl6pPr marL="1919783" indent="0">
+              <a:buNone/>
+              <a:defRPr sz="1680"/>
             </a:lvl6pPr>
-            <a:lvl7pPr marL="2743200" indent="0">
-              <a:buNone/>
-              <a:defRPr sz="2000"/>
+            <a:lvl7pPr marL="2303739" indent="0">
+              <a:buNone/>
+              <a:defRPr sz="1680"/>
             </a:lvl7pPr>
-            <a:lvl8pPr marL="3200400" indent="0">
-              <a:buNone/>
-              <a:defRPr sz="2000"/>
+            <a:lvl8pPr marL="2687696" indent="0">
+              <a:buNone/>
+              <a:defRPr sz="1680"/>
             </a:lvl8pPr>
-            <a:lvl9pPr marL="3657600" indent="0">
-              <a:buNone/>
-              <a:defRPr sz="2000"/>
+            <a:lvl9pPr marL="3071652" indent="0">
+              <a:buNone/>
+              <a:defRPr sz="1680"/>
             </a:lvl9pPr>
           </a:lstStyle>
           <a:p>
-            <a:endParaRPr lang="en-CA"/>
-          </a:p>
-        </p:txBody>
-      </p:sp>
-      <p:sp>
-        <p:nvSpPr>
-          <p:cNvPr id="4" name="Text Placeholder 3">
-            <a:extLst>
-              <a:ext uri="{FF2B5EF4-FFF2-40B4-BE49-F238E27FC236}">
-                <a16:creationId xmlns:a16="http://schemas.microsoft.com/office/drawing/2014/main" id="{CDCDAC75-924E-EE32-A606-CB5FDA181A1B}"/>
-              </a:ext>
-            </a:extLst>
-          </p:cNvPr>
+            <a:r>
+              <a:rPr lang="en-US"/>
+              <a:t>Click icon to add picture</a:t>
+            </a:r>
+            <a:endParaRPr lang="en-US" dirty="0"/>
+          </a:p>
+        </p:txBody>
+      </p:sp>
+      <p:sp>
+        <p:nvSpPr>
+          <p:cNvPr id="4" name="Text Placeholder 3"/>
           <p:cNvSpPr>
             <a:spLocks noGrp="1"/>
           </p:cNvSpPr>
@@ -3048,8 +2729,8 @@
         </p:nvSpPr>
         <p:spPr>
           <a:xfrm>
-            <a:off x="839788" y="2057400"/>
-            <a:ext cx="3932237" cy="3811588"/>
+            <a:off x="743891" y="1727835"/>
+            <a:ext cx="3483204" cy="3201028"/>
           </a:xfrm>
         </p:spPr>
         <p:txBody>
@@ -3057,39 +2738,39 @@
           <a:lstStyle>
             <a:lvl1pPr marL="0" indent="0">
               <a:buNone/>
-              <a:defRPr sz="1600"/>
+              <a:defRPr sz="1344"/>
             </a:lvl1pPr>
-            <a:lvl2pPr marL="457200" indent="0">
-              <a:buNone/>
-              <a:defRPr sz="1400"/>
+            <a:lvl2pPr marL="383957" indent="0">
+              <a:buNone/>
+              <a:defRPr sz="1176"/>
             </a:lvl2pPr>
-            <a:lvl3pPr marL="914400" indent="0">
-              <a:buNone/>
-              <a:defRPr sz="1200"/>
+            <a:lvl3pPr marL="767913" indent="0">
+              <a:buNone/>
+              <a:defRPr sz="1008"/>
             </a:lvl3pPr>
-            <a:lvl4pPr marL="1371600" indent="0">
-              <a:buNone/>
-              <a:defRPr sz="1000"/>
+            <a:lvl4pPr marL="1151870" indent="0">
+              <a:buNone/>
+              <a:defRPr sz="840"/>
             </a:lvl4pPr>
-            <a:lvl5pPr marL="1828800" indent="0">
-              <a:buNone/>
-              <a:defRPr sz="1000"/>
+            <a:lvl5pPr marL="1535826" indent="0">
+              <a:buNone/>
+              <a:defRPr sz="840"/>
             </a:lvl5pPr>
-            <a:lvl6pPr marL="2286000" indent="0">
-              <a:buNone/>
-              <a:defRPr sz="1000"/>
+            <a:lvl6pPr marL="1919783" indent="0">
+              <a:buNone/>
+              <a:defRPr sz="840"/>
             </a:lvl6pPr>
-            <a:lvl7pPr marL="2743200" indent="0">
-              <a:buNone/>
-              <a:defRPr sz="1000"/>
+            <a:lvl7pPr marL="2303739" indent="0">
+              <a:buNone/>
+              <a:defRPr sz="840"/>
             </a:lvl7pPr>
-            <a:lvl8pPr marL="3200400" indent="0">
-              <a:buNone/>
-              <a:defRPr sz="1000"/>
+            <a:lvl8pPr marL="2687696" indent="0">
+              <a:buNone/>
+              <a:defRPr sz="840"/>
             </a:lvl8pPr>
-            <a:lvl9pPr marL="3657600" indent="0">
-              <a:buNone/>
-              <a:defRPr sz="1000"/>
+            <a:lvl9pPr marL="3071652" indent="0">
+              <a:buNone/>
+              <a:defRPr sz="840"/>
             </a:lvl9pPr>
           </a:lstStyle>
           <a:p>
@@ -3103,13 +2784,7 @@
       </p:sp>
       <p:sp>
         <p:nvSpPr>
-          <p:cNvPr id="5" name="Date Placeholder 4">
-            <a:extLst>
-              <a:ext uri="{FF2B5EF4-FFF2-40B4-BE49-F238E27FC236}">
-                <a16:creationId xmlns:a16="http://schemas.microsoft.com/office/drawing/2014/main" id="{DA540A8E-D2C6-7CCB-9093-E239E51C7826}"/>
-              </a:ext>
-            </a:extLst>
-          </p:cNvPr>
+          <p:cNvPr id="5" name="Date Placeholder 4"/>
           <p:cNvSpPr>
             <a:spLocks noGrp="1"/>
           </p:cNvSpPr>
@@ -3124,7 +2799,7 @@
           <a:p>
             <a:fld id="{5899F6B3-811F-4FB0-8A8F-1ECB6174A6D5}" type="datetimeFigureOut">
               <a:rPr lang="en-CA" smtClean="0"/>
-              <a:t>2025-07-24</a:t>
+              <a:t>2025-08-22</a:t>
             </a:fld>
             <a:endParaRPr lang="en-CA"/>
           </a:p>
@@ -3132,13 +2807,7 @@
       </p:sp>
       <p:sp>
         <p:nvSpPr>
-          <p:cNvPr id="6" name="Footer Placeholder 5">
-            <a:extLst>
-              <a:ext uri="{FF2B5EF4-FFF2-40B4-BE49-F238E27FC236}">
-                <a16:creationId xmlns:a16="http://schemas.microsoft.com/office/drawing/2014/main" id="{AA1A6C81-DB5E-5EA9-DC82-EA42EB6BB3CD}"/>
-              </a:ext>
-            </a:extLst>
-          </p:cNvPr>
+          <p:cNvPr id="6" name="Footer Placeholder 5"/>
           <p:cNvSpPr>
             <a:spLocks noGrp="1"/>
           </p:cNvSpPr>
@@ -3157,13 +2826,7 @@
       </p:sp>
       <p:sp>
         <p:nvSpPr>
-          <p:cNvPr id="7" name="Slide Number Placeholder 6">
-            <a:extLst>
-              <a:ext uri="{FF2B5EF4-FFF2-40B4-BE49-F238E27FC236}">
-                <a16:creationId xmlns:a16="http://schemas.microsoft.com/office/drawing/2014/main" id="{4C916BBC-90EC-A9D0-3A44-EAE524ABB19A}"/>
-              </a:ext>
-            </a:extLst>
-          </p:cNvPr>
+          <p:cNvPr id="7" name="Slide Number Placeholder 6"/>
           <p:cNvSpPr>
             <a:spLocks noGrp="1"/>
           </p:cNvSpPr>
@@ -3187,7 +2850,7 @@
     </p:spTree>
     <p:extLst>
       <p:ext uri="{BB962C8B-B14F-4D97-AF65-F5344CB8AC3E}">
-        <p14:creationId xmlns:p14="http://schemas.microsoft.com/office/powerpoint/2010/main" val="3286843298"/>
+        <p14:creationId xmlns:p14="http://schemas.microsoft.com/office/powerpoint/2010/main" val="952895627"/>
       </p:ext>
     </p:extLst>
   </p:cSld>
@@ -3221,13 +2884,7 @@
       </p:grpSpPr>
       <p:sp>
         <p:nvSpPr>
-          <p:cNvPr id="2" name="Title Placeholder 1">
-            <a:extLst>
-              <a:ext uri="{FF2B5EF4-FFF2-40B4-BE49-F238E27FC236}">
-                <a16:creationId xmlns:a16="http://schemas.microsoft.com/office/drawing/2014/main" id="{3535AD17-8F41-257F-81D4-8920CCD49E95}"/>
-              </a:ext>
-            </a:extLst>
-          </p:cNvPr>
+          <p:cNvPr id="2" name="Title Placeholder 1"/>
           <p:cNvSpPr>
             <a:spLocks noGrp="1"/>
           </p:cNvSpPr>
@@ -3237,8 +2894,8 @@
         </p:nvSpPr>
         <p:spPr>
           <a:xfrm>
-            <a:off x="838200" y="365125"/>
-            <a:ext cx="10515600" cy="1325563"/>
+            <a:off x="742484" y="306638"/>
+            <a:ext cx="9314796" cy="1113227"/>
           </a:xfrm>
           <a:prstGeom prst="rect">
             <a:avLst/>
@@ -3254,19 +2911,13 @@
               <a:rPr lang="en-US"/>
               <a:t>Click to edit Master title style</a:t>
             </a:r>
-            <a:endParaRPr lang="en-CA"/>
-          </a:p>
-        </p:txBody>
-      </p:sp>
-      <p:sp>
-        <p:nvSpPr>
-          <p:cNvPr id="3" name="Text Placeholder 2">
-            <a:extLst>
-              <a:ext uri="{FF2B5EF4-FFF2-40B4-BE49-F238E27FC236}">
-                <a16:creationId xmlns:a16="http://schemas.microsoft.com/office/drawing/2014/main" id="{947369BD-FA62-0E8F-A1C6-F49815DADC17}"/>
-              </a:ext>
-            </a:extLst>
-          </p:cNvPr>
+            <a:endParaRPr lang="en-US" dirty="0"/>
+          </a:p>
+        </p:txBody>
+      </p:sp>
+      <p:sp>
+        <p:nvSpPr>
+          <p:cNvPr id="3" name="Text Placeholder 2"/>
           <p:cNvSpPr>
             <a:spLocks noGrp="1"/>
           </p:cNvSpPr>
@@ -3276,8 +2927,8 @@
         </p:nvSpPr>
         <p:spPr>
           <a:xfrm>
-            <a:off x="838200" y="1825625"/>
-            <a:ext cx="10515600" cy="4351338"/>
+            <a:off x="742484" y="1533187"/>
+            <a:ext cx="9314796" cy="3654318"/>
           </a:xfrm>
           <a:prstGeom prst="rect">
             <a:avLst/>
@@ -3322,19 +2973,13 @@
               <a:rPr lang="en-US"/>
               <a:t>Fifth level</a:t>
             </a:r>
-            <a:endParaRPr lang="en-CA"/>
-          </a:p>
-        </p:txBody>
-      </p:sp>
-      <p:sp>
-        <p:nvSpPr>
-          <p:cNvPr id="4" name="Date Placeholder 3">
-            <a:extLst>
-              <a:ext uri="{FF2B5EF4-FFF2-40B4-BE49-F238E27FC236}">
-                <a16:creationId xmlns:a16="http://schemas.microsoft.com/office/drawing/2014/main" id="{07E9D26A-0BAA-E56C-D330-3BA41370ADA8}"/>
-              </a:ext>
-            </a:extLst>
-          </p:cNvPr>
+            <a:endParaRPr lang="en-US" dirty="0"/>
+          </a:p>
+        </p:txBody>
+      </p:sp>
+      <p:sp>
+        <p:nvSpPr>
+          <p:cNvPr id="4" name="Date Placeholder 3"/>
           <p:cNvSpPr>
             <a:spLocks noGrp="1"/>
           </p:cNvSpPr>
@@ -3344,8 +2989,8 @@
         </p:nvSpPr>
         <p:spPr>
           <a:xfrm>
-            <a:off x="838200" y="6356350"/>
-            <a:ext cx="2743200" cy="365125"/>
+            <a:off x="742484" y="5338158"/>
+            <a:ext cx="2429947" cy="306637"/>
           </a:xfrm>
           <a:prstGeom prst="rect">
             <a:avLst/>
@@ -3355,7 +3000,7 @@
           <a:bodyPr vert="horz" lIns="91440" tIns="45720" rIns="91440" bIns="45720" rtlCol="0" anchor="ctr"/>
           <a:lstStyle>
             <a:lvl1pPr algn="l">
-              <a:defRPr sz="1200">
+              <a:defRPr sz="1008">
                 <a:solidFill>
                   <a:schemeClr val="tx1">
                     <a:tint val="82000"/>
@@ -3367,7 +3012,7 @@
           <a:p>
             <a:fld id="{5899F6B3-811F-4FB0-8A8F-1ECB6174A6D5}" type="datetimeFigureOut">
               <a:rPr lang="en-CA" smtClean="0"/>
-              <a:t>2025-07-24</a:t>
+              <a:t>2025-08-22</a:t>
             </a:fld>
             <a:endParaRPr lang="en-CA"/>
           </a:p>
@@ -3375,13 +3020,7 @@
       </p:sp>
       <p:sp>
         <p:nvSpPr>
-          <p:cNvPr id="5" name="Footer Placeholder 4">
-            <a:extLst>
-              <a:ext uri="{FF2B5EF4-FFF2-40B4-BE49-F238E27FC236}">
-                <a16:creationId xmlns:a16="http://schemas.microsoft.com/office/drawing/2014/main" id="{6B2ECAB9-36F9-B27E-204E-B76FA37DEE76}"/>
-              </a:ext>
-            </a:extLst>
-          </p:cNvPr>
+          <p:cNvPr id="5" name="Footer Placeholder 4"/>
           <p:cNvSpPr>
             <a:spLocks noGrp="1"/>
           </p:cNvSpPr>
@@ -3391,8 +3030,8 @@
         </p:nvSpPr>
         <p:spPr>
           <a:xfrm>
-            <a:off x="4038600" y="6356350"/>
-            <a:ext cx="4114800" cy="365125"/>
+            <a:off x="3577422" y="5338158"/>
+            <a:ext cx="3644920" cy="306637"/>
           </a:xfrm>
           <a:prstGeom prst="rect">
             <a:avLst/>
@@ -3402,7 +3041,7 @@
           <a:bodyPr vert="horz" lIns="91440" tIns="45720" rIns="91440" bIns="45720" rtlCol="0" anchor="ctr"/>
           <a:lstStyle>
             <a:lvl1pPr algn="ctr">
-              <a:defRPr sz="1200">
+              <a:defRPr sz="1008">
                 <a:solidFill>
                   <a:schemeClr val="tx1">
                     <a:tint val="82000"/>
@@ -3418,13 +3057,7 @@
       </p:sp>
       <p:sp>
         <p:nvSpPr>
-          <p:cNvPr id="6" name="Slide Number Placeholder 5">
-            <a:extLst>
-              <a:ext uri="{FF2B5EF4-FFF2-40B4-BE49-F238E27FC236}">
-                <a16:creationId xmlns:a16="http://schemas.microsoft.com/office/drawing/2014/main" id="{25464F5B-38CE-DBCD-1C06-B6C9F22E8F80}"/>
-              </a:ext>
-            </a:extLst>
-          </p:cNvPr>
+          <p:cNvPr id="6" name="Slide Number Placeholder 5"/>
           <p:cNvSpPr>
             <a:spLocks noGrp="1"/>
           </p:cNvSpPr>
@@ -3434,8 +3067,8 @@
         </p:nvSpPr>
         <p:spPr>
           <a:xfrm>
-            <a:off x="8610600" y="6356350"/>
-            <a:ext cx="2743200" cy="365125"/>
+            <a:off x="7627332" y="5338158"/>
+            <a:ext cx="2429947" cy="306637"/>
           </a:xfrm>
           <a:prstGeom prst="rect">
             <a:avLst/>
@@ -3445,7 +3078,7 @@
           <a:bodyPr vert="horz" lIns="91440" tIns="45720" rIns="91440" bIns="45720" rtlCol="0" anchor="ctr"/>
           <a:lstStyle>
             <a:lvl1pPr algn="r">
-              <a:defRPr sz="1200">
+              <a:defRPr sz="1008">
                 <a:solidFill>
                   <a:schemeClr val="tx1">
                     <a:tint val="82000"/>
@@ -3466,27 +3099,27 @@
     </p:spTree>
     <p:extLst>
       <p:ext uri="{BB962C8B-B14F-4D97-AF65-F5344CB8AC3E}">
-        <p14:creationId xmlns:p14="http://schemas.microsoft.com/office/powerpoint/2010/main" val="1289462931"/>
+        <p14:creationId xmlns:p14="http://schemas.microsoft.com/office/powerpoint/2010/main" val="2426622091"/>
       </p:ext>
     </p:extLst>
   </p:cSld>
   <p:clrMap bg1="lt1" tx1="dk1" bg2="lt2" tx2="dk2" accent1="accent1" accent2="accent2" accent3="accent3" accent4="accent4" accent5="accent5" accent6="accent6" hlink="hlink" folHlink="folHlink"/>
   <p:sldLayoutIdLst>
-    <p:sldLayoutId id="2147483649" r:id="rId1"/>
-    <p:sldLayoutId id="2147483650" r:id="rId2"/>
-    <p:sldLayoutId id="2147483651" r:id="rId3"/>
-    <p:sldLayoutId id="2147483652" r:id="rId4"/>
-    <p:sldLayoutId id="2147483653" r:id="rId5"/>
-    <p:sldLayoutId id="2147483654" r:id="rId6"/>
-    <p:sldLayoutId id="2147483655" r:id="rId7"/>
-    <p:sldLayoutId id="2147483656" r:id="rId8"/>
-    <p:sldLayoutId id="2147483657" r:id="rId9"/>
-    <p:sldLayoutId id="2147483658" r:id="rId10"/>
-    <p:sldLayoutId id="2147483659" r:id="rId11"/>
+    <p:sldLayoutId id="2147483661" r:id="rId1"/>
+    <p:sldLayoutId id="2147483662" r:id="rId2"/>
+    <p:sldLayoutId id="2147483663" r:id="rId3"/>
+    <p:sldLayoutId id="2147483664" r:id="rId4"/>
+    <p:sldLayoutId id="2147483665" r:id="rId5"/>
+    <p:sldLayoutId id="2147483666" r:id="rId6"/>
+    <p:sldLayoutId id="2147483667" r:id="rId7"/>
+    <p:sldLayoutId id="2147483668" r:id="rId8"/>
+    <p:sldLayoutId id="2147483669" r:id="rId9"/>
+    <p:sldLayoutId id="2147483670" r:id="rId10"/>
+    <p:sldLayoutId id="2147483671" r:id="rId11"/>
   </p:sldLayoutIdLst>
   <p:txStyles>
     <p:titleStyle>
-      <a:lvl1pPr algn="l" defTabSz="914400" rtl="0" eaLnBrk="1" latinLnBrk="0" hangingPunct="1">
+      <a:lvl1pPr algn="l" defTabSz="767913" rtl="0" eaLnBrk="1" latinLnBrk="0" hangingPunct="1">
         <a:lnSpc>
           <a:spcPct val="90000"/>
         </a:lnSpc>
@@ -3494,7 +3127,7 @@
           <a:spcPct val="0"/>
         </a:spcBef>
         <a:buNone/>
-        <a:defRPr sz="4400" kern="1200">
+        <a:defRPr sz="3695" kern="1200">
           <a:solidFill>
             <a:schemeClr val="tx1"/>
           </a:solidFill>
@@ -3505,16 +3138,16 @@
       </a:lvl1pPr>
     </p:titleStyle>
     <p:bodyStyle>
-      <a:lvl1pPr marL="228600" indent="-228600" algn="l" defTabSz="914400" rtl="0" eaLnBrk="1" latinLnBrk="0" hangingPunct="1">
+      <a:lvl1pPr marL="191978" indent="-191978" algn="l" defTabSz="767913" rtl="0" eaLnBrk="1" latinLnBrk="0" hangingPunct="1">
         <a:lnSpc>
           <a:spcPct val="90000"/>
         </a:lnSpc>
         <a:spcBef>
-          <a:spcPts val="1000"/>
+          <a:spcPts val="840"/>
         </a:spcBef>
         <a:buFont typeface="Arial" panose="020B0604020202020204" pitchFamily="34" charset="0"/>
         <a:buChar char="•"/>
-        <a:defRPr sz="2800" kern="1200">
+        <a:defRPr sz="2351" kern="1200">
           <a:solidFill>
             <a:schemeClr val="tx1"/>
           </a:solidFill>
@@ -3523,16 +3156,16 @@
           <a:cs typeface="+mn-cs"/>
         </a:defRPr>
       </a:lvl1pPr>
-      <a:lvl2pPr marL="685800" indent="-228600" algn="l" defTabSz="914400" rtl="0" eaLnBrk="1" latinLnBrk="0" hangingPunct="1">
+      <a:lvl2pPr marL="575935" indent="-191978" algn="l" defTabSz="767913" rtl="0" eaLnBrk="1" latinLnBrk="0" hangingPunct="1">
         <a:lnSpc>
           <a:spcPct val="90000"/>
         </a:lnSpc>
         <a:spcBef>
-          <a:spcPts val="500"/>
+          <a:spcPts val="420"/>
         </a:spcBef>
         <a:buFont typeface="Arial" panose="020B0604020202020204" pitchFamily="34" charset="0"/>
         <a:buChar char="•"/>
-        <a:defRPr sz="2400" kern="1200">
+        <a:defRPr sz="2016" kern="1200">
           <a:solidFill>
             <a:schemeClr val="tx1"/>
           </a:solidFill>
@@ -3541,16 +3174,16 @@
           <a:cs typeface="+mn-cs"/>
         </a:defRPr>
       </a:lvl2pPr>
-      <a:lvl3pPr marL="1143000" indent="-228600" algn="l" defTabSz="914400" rtl="0" eaLnBrk="1" latinLnBrk="0" hangingPunct="1">
+      <a:lvl3pPr marL="959891" indent="-191978" algn="l" defTabSz="767913" rtl="0" eaLnBrk="1" latinLnBrk="0" hangingPunct="1">
         <a:lnSpc>
           <a:spcPct val="90000"/>
         </a:lnSpc>
         <a:spcBef>
-          <a:spcPts val="500"/>
+          <a:spcPts val="420"/>
         </a:spcBef>
         <a:buFont typeface="Arial" panose="020B0604020202020204" pitchFamily="34" charset="0"/>
         <a:buChar char="•"/>
-        <a:defRPr sz="2000" kern="1200">
+        <a:defRPr sz="1680" kern="1200">
           <a:solidFill>
             <a:schemeClr val="tx1"/>
           </a:solidFill>
@@ -3559,16 +3192,16 @@
           <a:cs typeface="+mn-cs"/>
         </a:defRPr>
       </a:lvl3pPr>
-      <a:lvl4pPr marL="1600200" indent="-228600" algn="l" defTabSz="914400" rtl="0" eaLnBrk="1" latinLnBrk="0" hangingPunct="1">
+      <a:lvl4pPr marL="1343848" indent="-191978" algn="l" defTabSz="767913" rtl="0" eaLnBrk="1" latinLnBrk="0" hangingPunct="1">
         <a:lnSpc>
           <a:spcPct val="90000"/>
         </a:lnSpc>
         <a:spcBef>
-          <a:spcPts val="500"/>
+          <a:spcPts val="420"/>
         </a:spcBef>
         <a:buFont typeface="Arial" panose="020B0604020202020204" pitchFamily="34" charset="0"/>
         <a:buChar char="•"/>
-        <a:defRPr sz="1800" kern="1200">
+        <a:defRPr sz="1512" kern="1200">
           <a:solidFill>
             <a:schemeClr val="tx1"/>
           </a:solidFill>
@@ -3577,16 +3210,16 @@
           <a:cs typeface="+mn-cs"/>
         </a:defRPr>
       </a:lvl4pPr>
-      <a:lvl5pPr marL="2057400" indent="-228600" algn="l" defTabSz="914400" rtl="0" eaLnBrk="1" latinLnBrk="0" hangingPunct="1">
+      <a:lvl5pPr marL="1727805" indent="-191978" algn="l" defTabSz="767913" rtl="0" eaLnBrk="1" latinLnBrk="0" hangingPunct="1">
         <a:lnSpc>
           <a:spcPct val="90000"/>
         </a:lnSpc>
         <a:spcBef>
-          <a:spcPts val="500"/>
+          <a:spcPts val="420"/>
         </a:spcBef>
         <a:buFont typeface="Arial" panose="020B0604020202020204" pitchFamily="34" charset="0"/>
         <a:buChar char="•"/>
-        <a:defRPr sz="1800" kern="1200">
+        <a:defRPr sz="1512" kern="1200">
           <a:solidFill>
             <a:schemeClr val="tx1"/>
           </a:solidFill>
@@ -3595,16 +3228,16 @@
           <a:cs typeface="+mn-cs"/>
         </a:defRPr>
       </a:lvl5pPr>
-      <a:lvl6pPr marL="2514600" indent="-228600" algn="l" defTabSz="914400" rtl="0" eaLnBrk="1" latinLnBrk="0" hangingPunct="1">
+      <a:lvl6pPr marL="2111761" indent="-191978" algn="l" defTabSz="767913" rtl="0" eaLnBrk="1" latinLnBrk="0" hangingPunct="1">
         <a:lnSpc>
           <a:spcPct val="90000"/>
         </a:lnSpc>
         <a:spcBef>
-          <a:spcPts val="500"/>
+          <a:spcPts val="420"/>
         </a:spcBef>
         <a:buFont typeface="Arial" panose="020B0604020202020204" pitchFamily="34" charset="0"/>
         <a:buChar char="•"/>
-        <a:defRPr sz="1800" kern="1200">
+        <a:defRPr sz="1512" kern="1200">
           <a:solidFill>
             <a:schemeClr val="tx1"/>
           </a:solidFill>
@@ -3613,16 +3246,16 @@
           <a:cs typeface="+mn-cs"/>
         </a:defRPr>
       </a:lvl6pPr>
-      <a:lvl7pPr marL="2971800" indent="-228600" algn="l" defTabSz="914400" rtl="0" eaLnBrk="1" latinLnBrk="0" hangingPunct="1">
+      <a:lvl7pPr marL="2495718" indent="-191978" algn="l" defTabSz="767913" rtl="0" eaLnBrk="1" latinLnBrk="0" hangingPunct="1">
         <a:lnSpc>
           <a:spcPct val="90000"/>
         </a:lnSpc>
         <a:spcBef>
-          <a:spcPts val="500"/>
+          <a:spcPts val="420"/>
         </a:spcBef>
         <a:buFont typeface="Arial" panose="020B0604020202020204" pitchFamily="34" charset="0"/>
         <a:buChar char="•"/>
-        <a:defRPr sz="1800" kern="1200">
+        <a:defRPr sz="1512" kern="1200">
           <a:solidFill>
             <a:schemeClr val="tx1"/>
           </a:solidFill>
@@ -3631,16 +3264,16 @@
           <a:cs typeface="+mn-cs"/>
         </a:defRPr>
       </a:lvl7pPr>
-      <a:lvl8pPr marL="3429000" indent="-228600" algn="l" defTabSz="914400" rtl="0" eaLnBrk="1" latinLnBrk="0" hangingPunct="1">
+      <a:lvl8pPr marL="2879674" indent="-191978" algn="l" defTabSz="767913" rtl="0" eaLnBrk="1" latinLnBrk="0" hangingPunct="1">
         <a:lnSpc>
           <a:spcPct val="90000"/>
         </a:lnSpc>
         <a:spcBef>
-          <a:spcPts val="500"/>
+          <a:spcPts val="420"/>
         </a:spcBef>
         <a:buFont typeface="Arial" panose="020B0604020202020204" pitchFamily="34" charset="0"/>
         <a:buChar char="•"/>
-        <a:defRPr sz="1800" kern="1200">
+        <a:defRPr sz="1512" kern="1200">
           <a:solidFill>
             <a:schemeClr val="tx1"/>
           </a:solidFill>
@@ -3649,16 +3282,16 @@
           <a:cs typeface="+mn-cs"/>
         </a:defRPr>
       </a:lvl8pPr>
-      <a:lvl9pPr marL="3886200" indent="-228600" algn="l" defTabSz="914400" rtl="0" eaLnBrk="1" latinLnBrk="0" hangingPunct="1">
+      <a:lvl9pPr marL="3263631" indent="-191978" algn="l" defTabSz="767913" rtl="0" eaLnBrk="1" latinLnBrk="0" hangingPunct="1">
         <a:lnSpc>
           <a:spcPct val="90000"/>
         </a:lnSpc>
         <a:spcBef>
-          <a:spcPts val="500"/>
+          <a:spcPts val="420"/>
         </a:spcBef>
         <a:buFont typeface="Arial" panose="020B0604020202020204" pitchFamily="34" charset="0"/>
         <a:buChar char="•"/>
-        <a:defRPr sz="1800" kern="1200">
+        <a:defRPr sz="1512" kern="1200">
           <a:solidFill>
             <a:schemeClr val="tx1"/>
           </a:solidFill>
@@ -3672,8 +3305,8 @@
       <a:defPPr>
         <a:defRPr lang="en-US"/>
       </a:defPPr>
-      <a:lvl1pPr marL="0" algn="l" defTabSz="914400" rtl="0" eaLnBrk="1" latinLnBrk="0" hangingPunct="1">
-        <a:defRPr sz="1800" kern="1200">
+      <a:lvl1pPr marL="0" algn="l" defTabSz="767913" rtl="0" eaLnBrk="1" latinLnBrk="0" hangingPunct="1">
+        <a:defRPr sz="1512" kern="1200">
           <a:solidFill>
             <a:schemeClr val="tx1"/>
           </a:solidFill>
@@ -3682,8 +3315,8 @@
           <a:cs typeface="+mn-cs"/>
         </a:defRPr>
       </a:lvl1pPr>
-      <a:lvl2pPr marL="457200" algn="l" defTabSz="914400" rtl="0" eaLnBrk="1" latinLnBrk="0" hangingPunct="1">
-        <a:defRPr sz="1800" kern="1200">
+      <a:lvl2pPr marL="383957" algn="l" defTabSz="767913" rtl="0" eaLnBrk="1" latinLnBrk="0" hangingPunct="1">
+        <a:defRPr sz="1512" kern="1200">
           <a:solidFill>
             <a:schemeClr val="tx1"/>
           </a:solidFill>
@@ -3692,8 +3325,8 @@
           <a:cs typeface="+mn-cs"/>
         </a:defRPr>
       </a:lvl2pPr>
-      <a:lvl3pPr marL="914400" algn="l" defTabSz="914400" rtl="0" eaLnBrk="1" latinLnBrk="0" hangingPunct="1">
-        <a:defRPr sz="1800" kern="1200">
+      <a:lvl3pPr marL="767913" algn="l" defTabSz="767913" rtl="0" eaLnBrk="1" latinLnBrk="0" hangingPunct="1">
+        <a:defRPr sz="1512" kern="1200">
           <a:solidFill>
             <a:schemeClr val="tx1"/>
           </a:solidFill>
@@ -3702,8 +3335,8 @@
           <a:cs typeface="+mn-cs"/>
         </a:defRPr>
       </a:lvl3pPr>
-      <a:lvl4pPr marL="1371600" algn="l" defTabSz="914400" rtl="0" eaLnBrk="1" latinLnBrk="0" hangingPunct="1">
-        <a:defRPr sz="1800" kern="1200">
+      <a:lvl4pPr marL="1151870" algn="l" defTabSz="767913" rtl="0" eaLnBrk="1" latinLnBrk="0" hangingPunct="1">
+        <a:defRPr sz="1512" kern="1200">
           <a:solidFill>
             <a:schemeClr val="tx1"/>
           </a:solidFill>
@@ -3712,8 +3345,8 @@
           <a:cs typeface="+mn-cs"/>
         </a:defRPr>
       </a:lvl4pPr>
-      <a:lvl5pPr marL="1828800" algn="l" defTabSz="914400" rtl="0" eaLnBrk="1" latinLnBrk="0" hangingPunct="1">
-        <a:defRPr sz="1800" kern="1200">
+      <a:lvl5pPr marL="1535826" algn="l" defTabSz="767913" rtl="0" eaLnBrk="1" latinLnBrk="0" hangingPunct="1">
+        <a:defRPr sz="1512" kern="1200">
           <a:solidFill>
             <a:schemeClr val="tx1"/>
           </a:solidFill>
@@ -3722,8 +3355,8 @@
           <a:cs typeface="+mn-cs"/>
         </a:defRPr>
       </a:lvl5pPr>
-      <a:lvl6pPr marL="2286000" algn="l" defTabSz="914400" rtl="0" eaLnBrk="1" latinLnBrk="0" hangingPunct="1">
-        <a:defRPr sz="1800" kern="1200">
+      <a:lvl6pPr marL="1919783" algn="l" defTabSz="767913" rtl="0" eaLnBrk="1" latinLnBrk="0" hangingPunct="1">
+        <a:defRPr sz="1512" kern="1200">
           <a:solidFill>
             <a:schemeClr val="tx1"/>
           </a:solidFill>
@@ -3732,8 +3365,8 @@
           <a:cs typeface="+mn-cs"/>
         </a:defRPr>
       </a:lvl6pPr>
-      <a:lvl7pPr marL="2743200" algn="l" defTabSz="914400" rtl="0" eaLnBrk="1" latinLnBrk="0" hangingPunct="1">
-        <a:defRPr sz="1800" kern="1200">
+      <a:lvl7pPr marL="2303739" algn="l" defTabSz="767913" rtl="0" eaLnBrk="1" latinLnBrk="0" hangingPunct="1">
+        <a:defRPr sz="1512" kern="1200">
           <a:solidFill>
             <a:schemeClr val="tx1"/>
           </a:solidFill>
@@ -3742,8 +3375,8 @@
           <a:cs typeface="+mn-cs"/>
         </a:defRPr>
       </a:lvl7pPr>
-      <a:lvl8pPr marL="3200400" algn="l" defTabSz="914400" rtl="0" eaLnBrk="1" latinLnBrk="0" hangingPunct="1">
-        <a:defRPr sz="1800" kern="1200">
+      <a:lvl8pPr marL="2687696" algn="l" defTabSz="767913" rtl="0" eaLnBrk="1" latinLnBrk="0" hangingPunct="1">
+        <a:defRPr sz="1512" kern="1200">
           <a:solidFill>
             <a:schemeClr val="tx1"/>
           </a:solidFill>
@@ -3752,8 +3385,8 @@
           <a:cs typeface="+mn-cs"/>
         </a:defRPr>
       </a:lvl8pPr>
-      <a:lvl9pPr marL="3657600" algn="l" defTabSz="914400" rtl="0" eaLnBrk="1" latinLnBrk="0" hangingPunct="1">
-        <a:defRPr sz="1800" kern="1200">
+      <a:lvl9pPr marL="3071652" algn="l" defTabSz="767913" rtl="0" eaLnBrk="1" latinLnBrk="0" hangingPunct="1">
+        <a:defRPr sz="1512" kern="1200">
           <a:solidFill>
             <a:schemeClr val="tx1"/>
           </a:solidFill>
@@ -3813,7 +3446,7 @@
         </p:blipFill>
         <p:spPr>
           <a:xfrm>
-            <a:off x="0" y="1155398"/>
+            <a:off x="-696119" y="606123"/>
             <a:ext cx="12192000" cy="4565142"/>
           </a:xfrm>
           <a:prstGeom prst="rect">
@@ -3849,7 +3482,7 @@
         </p:blipFill>
         <p:spPr>
           <a:xfrm>
-            <a:off x="1944465" y="3170380"/>
+            <a:off x="1248347" y="2621105"/>
             <a:ext cx="3825241" cy="2550160"/>
           </a:xfrm>
           <a:prstGeom prst="rect">
@@ -3885,7 +3518,7 @@
         </p:blipFill>
         <p:spPr>
           <a:xfrm>
-            <a:off x="0" y="3391387"/>
+            <a:off x="-696119" y="2842113"/>
             <a:ext cx="3172654" cy="2329153"/>
           </a:xfrm>
           <a:prstGeom prst="rect">
@@ -3921,7 +3554,7 @@
         </p:blipFill>
         <p:spPr>
           <a:xfrm>
-            <a:off x="3539512" y="3309866"/>
+            <a:off x="2843393" y="2760591"/>
             <a:ext cx="4281358" cy="2410674"/>
           </a:xfrm>
           <a:prstGeom prst="rect">
@@ -3957,7 +3590,7 @@
         </p:blipFill>
         <p:spPr>
           <a:xfrm>
-            <a:off x="5884657" y="3540120"/>
+            <a:off x="5188539" y="2990845"/>
             <a:ext cx="3872425" cy="2180420"/>
           </a:xfrm>
           <a:prstGeom prst="rect">
@@ -3994,7 +3627,7 @@
         </p:blipFill>
         <p:spPr>
           <a:xfrm>
-            <a:off x="8872898" y="3391386"/>
+            <a:off x="8176779" y="2842111"/>
             <a:ext cx="3250522" cy="2329154"/>
           </a:xfrm>
           <a:prstGeom prst="rect">
@@ -4015,10 +3648,430 @@
 </p:sld>
 </file>
 
+<file path=ppt/slides/slide2.xml><?xml version="1.0" encoding="utf-8"?>
+<p:sld xmlns:a="http://schemas.openxmlformats.org/drawingml/2006/main" xmlns:r="http://schemas.openxmlformats.org/officeDocument/2006/relationships" xmlns:p="http://schemas.openxmlformats.org/presentationml/2006/main">
+  <p:cSld>
+    <p:bg>
+      <p:bgPr>
+        <a:solidFill>
+          <a:schemeClr val="bg1"/>
+        </a:solidFill>
+        <a:effectLst/>
+      </p:bgPr>
+    </p:bg>
+    <p:spTree>
+      <p:nvGrpSpPr>
+        <p:cNvPr id="1" name=""/>
+        <p:cNvGrpSpPr/>
+        <p:nvPr/>
+      </p:nvGrpSpPr>
+      <p:grpSpPr>
+        <a:xfrm>
+          <a:off x="0" y="0"/>
+          <a:ext cx="0" cy="0"/>
+          <a:chOff x="0" y="0"/>
+          <a:chExt cx="0" cy="0"/>
+        </a:xfrm>
+      </p:grpSpPr>
+      <p:sp useBgFill="1">
+        <p:nvSpPr>
+          <p:cNvPr id="9" name="Rectangle 8">
+            <a:extLst>
+              <a:ext uri="{FF2B5EF4-FFF2-40B4-BE49-F238E27FC236}">
+                <a16:creationId xmlns:a16="http://schemas.microsoft.com/office/drawing/2014/main" id="{80CCAACE-815D-4A79-875A-B7EFC28F7D2B}"/>
+              </a:ext>
+              <a:ext uri="{C183D7F6-B498-43B3-948B-1728B52AA6E4}">
+                <adec:decorative xmlns:adec="http://schemas.microsoft.com/office/drawing/2017/decorative" val="1"/>
+              </a:ext>
+            </a:extLst>
+          </p:cNvPr>
+          <p:cNvSpPr>
+            <a:spLocks noGrp="1" noRot="1" noChangeAspect="1" noMove="1" noResize="1" noEditPoints="1" noAdjustHandles="1" noChangeArrowheads="1" noChangeShapeType="1" noTextEdit="1"/>
+          </p:cNvSpPr>
+          <p:nvPr>
+            <p:extLst>
+              <p:ext uri="{386F3935-93C4-4BCD-93E2-E3B085C9AB24}">
+                <p16:designElem xmlns:p16="http://schemas.microsoft.com/office/powerpoint/2015/main" val="1"/>
+              </p:ext>
+            </p:extLst>
+          </p:nvPr>
+        </p:nvSpPr>
+        <p:spPr bwMode="white">
+          <a:xfrm>
+            <a:off x="1349" y="0"/>
+            <a:ext cx="10797063" cy="5759450"/>
+          </a:xfrm>
+          <a:prstGeom prst="rect">
+            <a:avLst/>
+          </a:prstGeom>
+          <a:ln>
+            <a:noFill/>
+          </a:ln>
+        </p:spPr>
+        <p:style>
+          <a:lnRef idx="2">
+            <a:schemeClr val="accent1">
+              <a:shade val="50000"/>
+            </a:schemeClr>
+          </a:lnRef>
+          <a:fillRef idx="1">
+            <a:schemeClr val="accent1"/>
+          </a:fillRef>
+          <a:effectRef idx="0">
+            <a:schemeClr val="accent1"/>
+          </a:effectRef>
+          <a:fontRef idx="minor">
+            <a:schemeClr val="lt1"/>
+          </a:fontRef>
+        </p:style>
+        <p:txBody>
+          <a:bodyPr rtlCol="0" anchor="ctr"/>
+          <a:lstStyle>
+            <a:defPPr>
+              <a:defRPr lang="en-US"/>
+            </a:defPPr>
+            <a:lvl1pPr marL="0" algn="l" defTabSz="914400" rtl="0" eaLnBrk="1" latinLnBrk="0" hangingPunct="1">
+              <a:defRPr sz="1800" kern="1200">
+                <a:solidFill>
+                  <a:schemeClr val="lt1"/>
+                </a:solidFill>
+                <a:latin typeface="+mn-lt"/>
+                <a:ea typeface="+mn-ea"/>
+                <a:cs typeface="+mn-cs"/>
+              </a:defRPr>
+            </a:lvl1pPr>
+            <a:lvl2pPr marL="457200" algn="l" defTabSz="914400" rtl="0" eaLnBrk="1" latinLnBrk="0" hangingPunct="1">
+              <a:defRPr sz="1800" kern="1200">
+                <a:solidFill>
+                  <a:schemeClr val="lt1"/>
+                </a:solidFill>
+                <a:latin typeface="+mn-lt"/>
+                <a:ea typeface="+mn-ea"/>
+                <a:cs typeface="+mn-cs"/>
+              </a:defRPr>
+            </a:lvl2pPr>
+            <a:lvl3pPr marL="914400" algn="l" defTabSz="914400" rtl="0" eaLnBrk="1" latinLnBrk="0" hangingPunct="1">
+              <a:defRPr sz="1800" kern="1200">
+                <a:solidFill>
+                  <a:schemeClr val="lt1"/>
+                </a:solidFill>
+                <a:latin typeface="+mn-lt"/>
+                <a:ea typeface="+mn-ea"/>
+                <a:cs typeface="+mn-cs"/>
+              </a:defRPr>
+            </a:lvl3pPr>
+            <a:lvl4pPr marL="1371600" algn="l" defTabSz="914400" rtl="0" eaLnBrk="1" latinLnBrk="0" hangingPunct="1">
+              <a:defRPr sz="1800" kern="1200">
+                <a:solidFill>
+                  <a:schemeClr val="lt1"/>
+                </a:solidFill>
+                <a:latin typeface="+mn-lt"/>
+                <a:ea typeface="+mn-ea"/>
+                <a:cs typeface="+mn-cs"/>
+              </a:defRPr>
+            </a:lvl4pPr>
+            <a:lvl5pPr marL="1828800" algn="l" defTabSz="914400" rtl="0" eaLnBrk="1" latinLnBrk="0" hangingPunct="1">
+              <a:defRPr sz="1800" kern="1200">
+                <a:solidFill>
+                  <a:schemeClr val="lt1"/>
+                </a:solidFill>
+                <a:latin typeface="+mn-lt"/>
+                <a:ea typeface="+mn-ea"/>
+                <a:cs typeface="+mn-cs"/>
+              </a:defRPr>
+            </a:lvl5pPr>
+            <a:lvl6pPr marL="2286000" algn="l" defTabSz="914400" rtl="0" eaLnBrk="1" latinLnBrk="0" hangingPunct="1">
+              <a:defRPr sz="1800" kern="1200">
+                <a:solidFill>
+                  <a:schemeClr val="lt1"/>
+                </a:solidFill>
+                <a:latin typeface="+mn-lt"/>
+                <a:ea typeface="+mn-ea"/>
+                <a:cs typeface="+mn-cs"/>
+              </a:defRPr>
+            </a:lvl6pPr>
+            <a:lvl7pPr marL="2743200" algn="l" defTabSz="914400" rtl="0" eaLnBrk="1" latinLnBrk="0" hangingPunct="1">
+              <a:defRPr sz="1800" kern="1200">
+                <a:solidFill>
+                  <a:schemeClr val="lt1"/>
+                </a:solidFill>
+                <a:latin typeface="+mn-lt"/>
+                <a:ea typeface="+mn-ea"/>
+                <a:cs typeface="+mn-cs"/>
+              </a:defRPr>
+            </a:lvl7pPr>
+            <a:lvl8pPr marL="3200400" algn="l" defTabSz="914400" rtl="0" eaLnBrk="1" latinLnBrk="0" hangingPunct="1">
+              <a:defRPr sz="1800" kern="1200">
+                <a:solidFill>
+                  <a:schemeClr val="lt1"/>
+                </a:solidFill>
+                <a:latin typeface="+mn-lt"/>
+                <a:ea typeface="+mn-ea"/>
+                <a:cs typeface="+mn-cs"/>
+              </a:defRPr>
+            </a:lvl8pPr>
+            <a:lvl9pPr marL="3657600" algn="l" defTabSz="914400" rtl="0" eaLnBrk="1" latinLnBrk="0" hangingPunct="1">
+              <a:defRPr sz="1800" kern="1200">
+                <a:solidFill>
+                  <a:schemeClr val="lt1"/>
+                </a:solidFill>
+                <a:latin typeface="+mn-lt"/>
+                <a:ea typeface="+mn-ea"/>
+                <a:cs typeface="+mn-cs"/>
+              </a:defRPr>
+            </a:lvl9pPr>
+          </a:lstStyle>
+          <a:p>
+            <a:pPr algn="ctr"/>
+            <a:endParaRPr lang="en-US"/>
+          </a:p>
+        </p:txBody>
+      </p:sp>
+      <p:pic>
+        <p:nvPicPr>
+          <p:cNvPr id="7" name="Picture 6" descr="A person in a suit and tie&#10;&#10;AI-generated content may be incorrect.">
+            <a:extLst>
+              <a:ext uri="{FF2B5EF4-FFF2-40B4-BE49-F238E27FC236}">
+                <a16:creationId xmlns:a16="http://schemas.microsoft.com/office/drawing/2014/main" id="{D4CA5189-3B44-B137-BE30-C08ACA4B43B5}"/>
+              </a:ext>
+            </a:extLst>
+          </p:cNvPr>
+          <p:cNvPicPr>
+            <a:picLocks noChangeAspect="1"/>
+          </p:cNvPicPr>
+          <p:nvPr/>
+        </p:nvPicPr>
+        <p:blipFill rotWithShape="1">
+          <a:blip r:embed="rId2">
+            <a:extLst>
+              <a:ext uri="{28A0092B-C50C-407E-A947-70E740481C1C}">
+                <a14:useLocalDpi xmlns:a14="http://schemas.microsoft.com/office/drawing/2010/main" val="0"/>
+              </a:ext>
+            </a:extLst>
+          </a:blip>
+          <a:srcRect l="33715" t="2572" r="40310" b="58129"/>
+          <a:stretch>
+            <a:fillRect/>
+          </a:stretch>
+        </p:blipFill>
+        <p:spPr>
+          <a:xfrm>
+            <a:off x="5398530" y="0"/>
+            <a:ext cx="5399881" cy="5759450"/>
+          </a:xfrm>
+          <a:prstGeom prst="rect">
+            <a:avLst/>
+          </a:prstGeom>
+        </p:spPr>
+      </p:pic>
+      <p:pic>
+        <p:nvPicPr>
+          <p:cNvPr id="5" name="Picture 4" descr="A person in a suit and tie&#10;&#10;AI-generated content may be incorrect.">
+            <a:extLst>
+              <a:ext uri="{FF2B5EF4-FFF2-40B4-BE49-F238E27FC236}">
+                <a16:creationId xmlns:a16="http://schemas.microsoft.com/office/drawing/2014/main" id="{1F5A3B93-BAE5-94EB-17BD-E2AE1211B97A}"/>
+              </a:ext>
+            </a:extLst>
+          </p:cNvPr>
+          <p:cNvPicPr>
+            <a:picLocks noChangeAspect="1"/>
+          </p:cNvPicPr>
+          <p:nvPr/>
+        </p:nvPicPr>
+        <p:blipFill>
+          <a:blip r:embed="rId3">
+            <a:extLst>
+              <a:ext uri="{28A0092B-C50C-407E-A947-70E740481C1C}">
+                <a14:useLocalDpi xmlns:a14="http://schemas.microsoft.com/office/drawing/2010/main" val="0"/>
+              </a:ext>
+            </a:extLst>
+          </a:blip>
+          <a:srcRect l="26307" t="3354" r="26799" b="16595"/>
+          <a:stretch>
+            <a:fillRect/>
+          </a:stretch>
+        </p:blipFill>
+        <p:spPr>
+          <a:xfrm>
+            <a:off x="0" y="0"/>
+            <a:ext cx="5398530" cy="5760000"/>
+          </a:xfrm>
+          <a:prstGeom prst="rect">
+            <a:avLst/>
+          </a:prstGeom>
+        </p:spPr>
+      </p:pic>
+    </p:spTree>
+    <p:extLst>
+      <p:ext uri="{BB962C8B-B14F-4D97-AF65-F5344CB8AC3E}">
+        <p14:creationId xmlns:p14="http://schemas.microsoft.com/office/powerpoint/2010/main" val="354352303"/>
+      </p:ext>
+    </p:extLst>
+  </p:cSld>
+  <p:clrMapOvr>
+    <a:masterClrMapping/>
+  </p:clrMapOvr>
+</p:sld>
+</file>
+
+<file path=ppt/slides/slide3.xml><?xml version="1.0" encoding="utf-8"?>
+<p:sld xmlns:a="http://schemas.openxmlformats.org/drawingml/2006/main" xmlns:r="http://schemas.openxmlformats.org/officeDocument/2006/relationships" xmlns:p="http://schemas.openxmlformats.org/presentationml/2006/main">
+  <p:cSld>
+    <p:spTree>
+      <p:nvGrpSpPr>
+        <p:cNvPr id="1" name=""/>
+        <p:cNvGrpSpPr/>
+        <p:nvPr/>
+      </p:nvGrpSpPr>
+      <p:grpSpPr>
+        <a:xfrm>
+          <a:off x="0" y="0"/>
+          <a:ext cx="0" cy="0"/>
+          <a:chOff x="0" y="0"/>
+          <a:chExt cx="0" cy="0"/>
+        </a:xfrm>
+      </p:grpSpPr>
+      <p:sp>
+        <p:nvSpPr>
+          <p:cNvPr id="2" name="Title 1">
+            <a:extLst>
+              <a:ext uri="{FF2B5EF4-FFF2-40B4-BE49-F238E27FC236}">
+                <a16:creationId xmlns:a16="http://schemas.microsoft.com/office/drawing/2014/main" id="{0A87CFA5-9CD5-2137-7E5B-87DFAF95D559}"/>
+              </a:ext>
+            </a:extLst>
+          </p:cNvPr>
+          <p:cNvSpPr>
+            <a:spLocks noGrp="1"/>
+          </p:cNvSpPr>
+          <p:nvPr>
+            <p:ph type="title"/>
+          </p:nvPr>
+        </p:nvSpPr>
+        <p:spPr/>
+        <p:txBody>
+          <a:bodyPr/>
+          <a:lstStyle/>
+          <a:p>
+            <a:endParaRPr lang="en-CA"/>
+          </a:p>
+        </p:txBody>
+      </p:sp>
+      <p:sp>
+        <p:nvSpPr>
+          <p:cNvPr id="3" name="Content Placeholder 2">
+            <a:extLst>
+              <a:ext uri="{FF2B5EF4-FFF2-40B4-BE49-F238E27FC236}">
+                <a16:creationId xmlns:a16="http://schemas.microsoft.com/office/drawing/2014/main" id="{CDAE9784-8F65-951C-03BB-4A3980737C0D}"/>
+              </a:ext>
+            </a:extLst>
+          </p:cNvPr>
+          <p:cNvSpPr>
+            <a:spLocks noGrp="1"/>
+          </p:cNvSpPr>
+          <p:nvPr>
+            <p:ph idx="1"/>
+          </p:nvPr>
+        </p:nvSpPr>
+        <p:spPr/>
+        <p:txBody>
+          <a:bodyPr/>
+          <a:lstStyle/>
+          <a:p>
+            <a:endParaRPr lang="en-CA"/>
+          </a:p>
+        </p:txBody>
+      </p:sp>
+      <p:pic>
+        <p:nvPicPr>
+          <p:cNvPr id="4" name="Picture 3" descr="A person in a suit and tie&#10;&#10;AI-generated content may be incorrect.">
+            <a:extLst>
+              <a:ext uri="{FF2B5EF4-FFF2-40B4-BE49-F238E27FC236}">
+                <a16:creationId xmlns:a16="http://schemas.microsoft.com/office/drawing/2014/main" id="{A93EACE9-178E-041F-1458-E45085321DD6}"/>
+              </a:ext>
+            </a:extLst>
+          </p:cNvPr>
+          <p:cNvPicPr>
+            <a:picLocks noChangeAspect="1"/>
+          </p:cNvPicPr>
+          <p:nvPr/>
+        </p:nvPicPr>
+        <p:blipFill>
+          <a:blip r:embed="rId2" cstate="hqprint">
+            <a:extLst>
+              <a:ext uri="{28A0092B-C50C-407E-A947-70E740481C1C}">
+                <a14:useLocalDpi xmlns:a14="http://schemas.microsoft.com/office/drawing/2010/main"/>
+              </a:ext>
+            </a:extLst>
+          </a:blip>
+          <a:srcRect/>
+          <a:stretch>
+            <a:fillRect/>
+          </a:stretch>
+        </p:blipFill>
+        <p:spPr>
+          <a:xfrm>
+            <a:off x="0" y="0"/>
+            <a:ext cx="5398530" cy="5760000"/>
+          </a:xfrm>
+          <a:prstGeom prst="rect">
+            <a:avLst/>
+          </a:prstGeom>
+        </p:spPr>
+      </p:pic>
+      <p:pic>
+        <p:nvPicPr>
+          <p:cNvPr id="5" name="Picture 4" descr="A person in a suit and tie&#10;&#10;AI-generated content may be incorrect.">
+            <a:extLst>
+              <a:ext uri="{FF2B5EF4-FFF2-40B4-BE49-F238E27FC236}">
+                <a16:creationId xmlns:a16="http://schemas.microsoft.com/office/drawing/2014/main" id="{5FA09538-CB7E-A068-3875-292120BA3D0A}"/>
+              </a:ext>
+            </a:extLst>
+          </p:cNvPr>
+          <p:cNvPicPr>
+            <a:picLocks noChangeAspect="1"/>
+          </p:cNvPicPr>
+          <p:nvPr/>
+        </p:nvPicPr>
+        <p:blipFill rotWithShape="1">
+          <a:blip r:embed="rId3" cstate="hqprint">
+            <a:extLst>
+              <a:ext uri="{28A0092B-C50C-407E-A947-70E740481C1C}">
+                <a14:useLocalDpi xmlns:a14="http://schemas.microsoft.com/office/drawing/2010/main"/>
+              </a:ext>
+            </a:extLst>
+          </a:blip>
+          <a:srcRect/>
+          <a:stretch>
+            <a:fillRect/>
+          </a:stretch>
+        </p:blipFill>
+        <p:spPr>
+          <a:xfrm>
+            <a:off x="5398530" y="0"/>
+            <a:ext cx="5399881" cy="5759450"/>
+          </a:xfrm>
+          <a:prstGeom prst="rect">
+            <a:avLst/>
+          </a:prstGeom>
+        </p:spPr>
+      </p:pic>
+    </p:spTree>
+    <p:extLst>
+      <p:ext uri="{BB962C8B-B14F-4D97-AF65-F5344CB8AC3E}">
+        <p14:creationId xmlns:p14="http://schemas.microsoft.com/office/powerpoint/2010/main" val="3726788691"/>
+      </p:ext>
+    </p:extLst>
+  </p:cSld>
+  <p:clrMapOvr>
+    <a:masterClrMapping/>
+  </p:clrMapOvr>
+</p:sld>
+</file>
+
 <file path=ppt/theme/theme1.xml><?xml version="1.0" encoding="utf-8"?>
 <a:theme xmlns:a="http://schemas.openxmlformats.org/drawingml/2006/main" name="Office Theme">
   <a:themeElements>
-    <a:clrScheme name="Office">
+    <a:clrScheme name="Office Theme">
       <a:dk1>
         <a:sysClr val="windowText" lastClr="000000"/>
       </a:dk1>
@@ -4056,7 +4109,7 @@
         <a:srgbClr val="96607D"/>
       </a:folHlink>
     </a:clrScheme>
-    <a:fontScheme name="Office">
+    <a:fontScheme name="Office Theme">
       <a:majorFont>
         <a:latin typeface="Aptos Display" panose="02110004020202020204"/>
         <a:ea typeface=""/>
@@ -4162,7 +4215,7 @@
         <a:font script="Tfng" typeface="Ebrima"/>
       </a:minorFont>
     </a:fontScheme>
-    <a:fmtScheme name="Office">
+    <a:fmtScheme name="Office Theme">
       <a:fillStyleLst>
         <a:solidFill>
           <a:schemeClr val="phClr"/>

</xml_diff>